<commit_message>
progress: softmax in dev
</commit_message>
<xml_diff>
--- a/workshop_talk_dnn.pptx
+++ b/workshop_talk_dnn.pptx
@@ -4,11 +4,22 @@
   <p:sldMasterIdLst>
     <p:sldMasterId id="2147483660" r:id="rId1"/>
   </p:sldMasterIdLst>
+  <p:notesMasterIdLst>
+    <p:notesMasterId r:id="rId14"/>
+  </p:notesMasterIdLst>
   <p:sldIdLst>
     <p:sldId id="256" r:id="rId2"/>
     <p:sldId id="258" r:id="rId3"/>
     <p:sldId id="260" r:id="rId4"/>
-    <p:sldId id="259" r:id="rId5"/>
+    <p:sldId id="261" r:id="rId5"/>
+    <p:sldId id="259" r:id="rId6"/>
+    <p:sldId id="263" r:id="rId7"/>
+    <p:sldId id="262" r:id="rId8"/>
+    <p:sldId id="264" r:id="rId9"/>
+    <p:sldId id="268" r:id="rId10"/>
+    <p:sldId id="265" r:id="rId11"/>
+    <p:sldId id="266" r:id="rId12"/>
+    <p:sldId id="267" r:id="rId13"/>
   </p:sldIdLst>
   <p:sldSz cx="9144000" cy="6858000" type="screen4x3"/>
   <p:notesSz cx="6858000" cy="9144000"/>
@@ -107,7 +118,555 @@
       </a:defRPr>
     </a:lvl9pPr>
   </p:defaultTextStyle>
+  <p:extLst>
+    <p:ext uri="{EFAFB233-063F-42B5-8137-9DF3F51BA10A}">
+      <p15:sldGuideLst xmlns:p15="http://schemas.microsoft.com/office/powerpoint/2012/main"/>
+    </p:ext>
+  </p:extLst>
 </p:presentation>
+</file>
+
+<file path=ppt/notesMasters/notesMaster1.xml><?xml version="1.0" encoding="utf-8"?>
+<p:notesMaster xmlns:a="http://schemas.openxmlformats.org/drawingml/2006/main" xmlns:r="http://schemas.openxmlformats.org/officeDocument/2006/relationships" xmlns:p="http://schemas.openxmlformats.org/presentationml/2006/main">
+  <p:cSld>
+    <p:bg>
+      <p:bgRef idx="1001">
+        <a:schemeClr val="bg1"/>
+      </p:bgRef>
+    </p:bg>
+    <p:spTree>
+      <p:nvGrpSpPr>
+        <p:cNvPr id="1" name=""/>
+        <p:cNvGrpSpPr/>
+        <p:nvPr/>
+      </p:nvGrpSpPr>
+      <p:grpSpPr>
+        <a:xfrm>
+          <a:off x="0" y="0"/>
+          <a:ext cx="0" cy="0"/>
+          <a:chOff x="0" y="0"/>
+          <a:chExt cx="0" cy="0"/>
+        </a:xfrm>
+      </p:grpSpPr>
+      <p:sp>
+        <p:nvSpPr>
+          <p:cNvPr id="2" name="Header Placeholder 1"/>
+          <p:cNvSpPr>
+            <a:spLocks noGrp="1"/>
+          </p:cNvSpPr>
+          <p:nvPr>
+            <p:ph type="hdr" sz="quarter"/>
+          </p:nvPr>
+        </p:nvSpPr>
+        <p:spPr>
+          <a:xfrm>
+            <a:off x="0" y="0"/>
+            <a:ext cx="2971800" cy="458788"/>
+          </a:xfrm>
+          <a:prstGeom prst="rect">
+            <a:avLst/>
+          </a:prstGeom>
+        </p:spPr>
+        <p:txBody>
+          <a:bodyPr vert="horz" lIns="91440" tIns="45720" rIns="91440" bIns="45720" rtlCol="0"/>
+          <a:lstStyle>
+            <a:lvl1pPr algn="l">
+              <a:defRPr sz="1200"/>
+            </a:lvl1pPr>
+          </a:lstStyle>
+          <a:p>
+            <a:endParaRPr lang="en-US"/>
+          </a:p>
+        </p:txBody>
+      </p:sp>
+      <p:sp>
+        <p:nvSpPr>
+          <p:cNvPr id="3" name="Date Placeholder 2"/>
+          <p:cNvSpPr>
+            <a:spLocks noGrp="1"/>
+          </p:cNvSpPr>
+          <p:nvPr>
+            <p:ph type="dt" idx="1"/>
+          </p:nvPr>
+        </p:nvSpPr>
+        <p:spPr>
+          <a:xfrm>
+            <a:off x="3884613" y="0"/>
+            <a:ext cx="2971800" cy="458788"/>
+          </a:xfrm>
+          <a:prstGeom prst="rect">
+            <a:avLst/>
+          </a:prstGeom>
+        </p:spPr>
+        <p:txBody>
+          <a:bodyPr vert="horz" lIns="91440" tIns="45720" rIns="91440" bIns="45720" rtlCol="0"/>
+          <a:lstStyle>
+            <a:lvl1pPr algn="r">
+              <a:defRPr sz="1200"/>
+            </a:lvl1pPr>
+          </a:lstStyle>
+          <a:p>
+            <a:fld id="{EB8C2B8B-B271-C34A-858B-DE455E357BAD}" type="datetimeFigureOut">
+              <a:rPr lang="en-US" smtClean="0"/>
+              <a:t>8/27/15</a:t>
+            </a:fld>
+            <a:endParaRPr lang="en-US"/>
+          </a:p>
+        </p:txBody>
+      </p:sp>
+      <p:sp>
+        <p:nvSpPr>
+          <p:cNvPr id="4" name="Slide Image Placeholder 3"/>
+          <p:cNvSpPr>
+            <a:spLocks noGrp="1" noRot="1" noChangeAspect="1"/>
+          </p:cNvSpPr>
+          <p:nvPr>
+            <p:ph type="sldImg" idx="2"/>
+          </p:nvPr>
+        </p:nvSpPr>
+        <p:spPr>
+          <a:xfrm>
+            <a:off x="1371600" y="1143000"/>
+            <a:ext cx="4114800" cy="3086100"/>
+          </a:xfrm>
+          <a:prstGeom prst="rect">
+            <a:avLst/>
+          </a:prstGeom>
+          <a:noFill/>
+          <a:ln w="12700">
+            <a:solidFill>
+              <a:prstClr val="black"/>
+            </a:solidFill>
+          </a:ln>
+        </p:spPr>
+        <p:txBody>
+          <a:bodyPr vert="horz" lIns="91440" tIns="45720" rIns="91440" bIns="45720" rtlCol="0" anchor="ctr"/>
+          <a:lstStyle/>
+          <a:p>
+            <a:endParaRPr lang="en-US"/>
+          </a:p>
+        </p:txBody>
+      </p:sp>
+      <p:sp>
+        <p:nvSpPr>
+          <p:cNvPr id="5" name="Notes Placeholder 4"/>
+          <p:cNvSpPr>
+            <a:spLocks noGrp="1"/>
+          </p:cNvSpPr>
+          <p:nvPr>
+            <p:ph type="body" sz="quarter" idx="3"/>
+          </p:nvPr>
+        </p:nvSpPr>
+        <p:spPr>
+          <a:xfrm>
+            <a:off x="685800" y="4400550"/>
+            <a:ext cx="5486400" cy="3600450"/>
+          </a:xfrm>
+          <a:prstGeom prst="rect">
+            <a:avLst/>
+          </a:prstGeom>
+        </p:spPr>
+        <p:txBody>
+          <a:bodyPr vert="horz" lIns="91440" tIns="45720" rIns="91440" bIns="45720" rtlCol="0"/>
+          <a:lstStyle/>
+          <a:p>
+            <a:pPr lvl="0"/>
+            <a:r>
+              <a:rPr lang="en-US" altLang="zh-CN" smtClean="0"/>
+              <a:t>Click to edit Master text styles</a:t>
+            </a:r>
+          </a:p>
+          <a:p>
+            <a:pPr lvl="1"/>
+            <a:r>
+              <a:rPr lang="en-US" altLang="zh-CN" smtClean="0"/>
+              <a:t>Second level</a:t>
+            </a:r>
+          </a:p>
+          <a:p>
+            <a:pPr lvl="2"/>
+            <a:r>
+              <a:rPr lang="en-US" altLang="zh-CN" smtClean="0"/>
+              <a:t>Third level</a:t>
+            </a:r>
+          </a:p>
+          <a:p>
+            <a:pPr lvl="3"/>
+            <a:r>
+              <a:rPr lang="en-US" altLang="zh-CN" smtClean="0"/>
+              <a:t>Fourth level</a:t>
+            </a:r>
+          </a:p>
+          <a:p>
+            <a:pPr lvl="4"/>
+            <a:r>
+              <a:rPr lang="en-US" altLang="zh-CN" smtClean="0"/>
+              <a:t>Fifth level</a:t>
+            </a:r>
+            <a:endParaRPr lang="en-US"/>
+          </a:p>
+        </p:txBody>
+      </p:sp>
+      <p:sp>
+        <p:nvSpPr>
+          <p:cNvPr id="6" name="Footer Placeholder 5"/>
+          <p:cNvSpPr>
+            <a:spLocks noGrp="1"/>
+          </p:cNvSpPr>
+          <p:nvPr>
+            <p:ph type="ftr" sz="quarter" idx="4"/>
+          </p:nvPr>
+        </p:nvSpPr>
+        <p:spPr>
+          <a:xfrm>
+            <a:off x="0" y="8685213"/>
+            <a:ext cx="2971800" cy="458787"/>
+          </a:xfrm>
+          <a:prstGeom prst="rect">
+            <a:avLst/>
+          </a:prstGeom>
+        </p:spPr>
+        <p:txBody>
+          <a:bodyPr vert="horz" lIns="91440" tIns="45720" rIns="91440" bIns="45720" rtlCol="0" anchor="b"/>
+          <a:lstStyle>
+            <a:lvl1pPr algn="l">
+              <a:defRPr sz="1200"/>
+            </a:lvl1pPr>
+          </a:lstStyle>
+          <a:p>
+            <a:endParaRPr lang="en-US"/>
+          </a:p>
+        </p:txBody>
+      </p:sp>
+      <p:sp>
+        <p:nvSpPr>
+          <p:cNvPr id="7" name="Slide Number Placeholder 6"/>
+          <p:cNvSpPr>
+            <a:spLocks noGrp="1"/>
+          </p:cNvSpPr>
+          <p:nvPr>
+            <p:ph type="sldNum" sz="quarter" idx="5"/>
+          </p:nvPr>
+        </p:nvSpPr>
+        <p:spPr>
+          <a:xfrm>
+            <a:off x="3884613" y="8685213"/>
+            <a:ext cx="2971800" cy="458787"/>
+          </a:xfrm>
+          <a:prstGeom prst="rect">
+            <a:avLst/>
+          </a:prstGeom>
+        </p:spPr>
+        <p:txBody>
+          <a:bodyPr vert="horz" lIns="91440" tIns="45720" rIns="91440" bIns="45720" rtlCol="0" anchor="b"/>
+          <a:lstStyle>
+            <a:lvl1pPr algn="r">
+              <a:defRPr sz="1200"/>
+            </a:lvl1pPr>
+          </a:lstStyle>
+          <a:p>
+            <a:fld id="{4E51F73A-5F5A-9E4D-98D0-6CD6CE479A3B}" type="slidenum">
+              <a:rPr lang="en-US" smtClean="0"/>
+              <a:t>‹#›</a:t>
+            </a:fld>
+            <a:endParaRPr lang="en-US"/>
+          </a:p>
+        </p:txBody>
+      </p:sp>
+    </p:spTree>
+    <p:extLst>
+      <p:ext uri="{BB962C8B-B14F-4D97-AF65-F5344CB8AC3E}">
+        <p14:creationId xmlns:p14="http://schemas.microsoft.com/office/powerpoint/2010/main" val="995706887"/>
+      </p:ext>
+    </p:extLst>
+  </p:cSld>
+  <p:clrMap bg1="lt1" tx1="dk1" bg2="lt2" tx2="dk2" accent1="accent1" accent2="accent2" accent3="accent3" accent4="accent4" accent5="accent5" accent6="accent6" hlink="hlink" folHlink="folHlink"/>
+  <p:notesStyle>
+    <a:lvl1pPr marL="0" algn="l" defTabSz="914400" rtl="0" eaLnBrk="1" latinLnBrk="0" hangingPunct="1">
+      <a:defRPr sz="1200" kern="1200">
+        <a:solidFill>
+          <a:schemeClr val="tx1"/>
+        </a:solidFill>
+        <a:latin typeface="+mn-lt"/>
+        <a:ea typeface="+mn-ea"/>
+        <a:cs typeface="+mn-cs"/>
+      </a:defRPr>
+    </a:lvl1pPr>
+    <a:lvl2pPr marL="457200" algn="l" defTabSz="914400" rtl="0" eaLnBrk="1" latinLnBrk="0" hangingPunct="1">
+      <a:defRPr sz="1200" kern="1200">
+        <a:solidFill>
+          <a:schemeClr val="tx1"/>
+        </a:solidFill>
+        <a:latin typeface="+mn-lt"/>
+        <a:ea typeface="+mn-ea"/>
+        <a:cs typeface="+mn-cs"/>
+      </a:defRPr>
+    </a:lvl2pPr>
+    <a:lvl3pPr marL="914400" algn="l" defTabSz="914400" rtl="0" eaLnBrk="1" latinLnBrk="0" hangingPunct="1">
+      <a:defRPr sz="1200" kern="1200">
+        <a:solidFill>
+          <a:schemeClr val="tx1"/>
+        </a:solidFill>
+        <a:latin typeface="+mn-lt"/>
+        <a:ea typeface="+mn-ea"/>
+        <a:cs typeface="+mn-cs"/>
+      </a:defRPr>
+    </a:lvl3pPr>
+    <a:lvl4pPr marL="1371600" algn="l" defTabSz="914400" rtl="0" eaLnBrk="1" latinLnBrk="0" hangingPunct="1">
+      <a:defRPr sz="1200" kern="1200">
+        <a:solidFill>
+          <a:schemeClr val="tx1"/>
+        </a:solidFill>
+        <a:latin typeface="+mn-lt"/>
+        <a:ea typeface="+mn-ea"/>
+        <a:cs typeface="+mn-cs"/>
+      </a:defRPr>
+    </a:lvl4pPr>
+    <a:lvl5pPr marL="1828800" algn="l" defTabSz="914400" rtl="0" eaLnBrk="1" latinLnBrk="0" hangingPunct="1">
+      <a:defRPr sz="1200" kern="1200">
+        <a:solidFill>
+          <a:schemeClr val="tx1"/>
+        </a:solidFill>
+        <a:latin typeface="+mn-lt"/>
+        <a:ea typeface="+mn-ea"/>
+        <a:cs typeface="+mn-cs"/>
+      </a:defRPr>
+    </a:lvl5pPr>
+    <a:lvl6pPr marL="2286000" algn="l" defTabSz="914400" rtl="0" eaLnBrk="1" latinLnBrk="0" hangingPunct="1">
+      <a:defRPr sz="1200" kern="1200">
+        <a:solidFill>
+          <a:schemeClr val="tx1"/>
+        </a:solidFill>
+        <a:latin typeface="+mn-lt"/>
+        <a:ea typeface="+mn-ea"/>
+        <a:cs typeface="+mn-cs"/>
+      </a:defRPr>
+    </a:lvl6pPr>
+    <a:lvl7pPr marL="2743200" algn="l" defTabSz="914400" rtl="0" eaLnBrk="1" latinLnBrk="0" hangingPunct="1">
+      <a:defRPr sz="1200" kern="1200">
+        <a:solidFill>
+          <a:schemeClr val="tx1"/>
+        </a:solidFill>
+        <a:latin typeface="+mn-lt"/>
+        <a:ea typeface="+mn-ea"/>
+        <a:cs typeface="+mn-cs"/>
+      </a:defRPr>
+    </a:lvl7pPr>
+    <a:lvl8pPr marL="3200400" algn="l" defTabSz="914400" rtl="0" eaLnBrk="1" latinLnBrk="0" hangingPunct="1">
+      <a:defRPr sz="1200" kern="1200">
+        <a:solidFill>
+          <a:schemeClr val="tx1"/>
+        </a:solidFill>
+        <a:latin typeface="+mn-lt"/>
+        <a:ea typeface="+mn-ea"/>
+        <a:cs typeface="+mn-cs"/>
+      </a:defRPr>
+    </a:lvl8pPr>
+    <a:lvl9pPr marL="3657600" algn="l" defTabSz="914400" rtl="0" eaLnBrk="1" latinLnBrk="0" hangingPunct="1">
+      <a:defRPr sz="1200" kern="1200">
+        <a:solidFill>
+          <a:schemeClr val="tx1"/>
+        </a:solidFill>
+        <a:latin typeface="+mn-lt"/>
+        <a:ea typeface="+mn-ea"/>
+        <a:cs typeface="+mn-cs"/>
+      </a:defRPr>
+    </a:lvl9pPr>
+  </p:notesStyle>
+</p:notesMaster>
+</file>
+
+<file path=ppt/notesSlides/notesSlide1.xml><?xml version="1.0" encoding="utf-8"?>
+<p:notes xmlns:a="http://schemas.openxmlformats.org/drawingml/2006/main" xmlns:r="http://schemas.openxmlformats.org/officeDocument/2006/relationships" xmlns:p="http://schemas.openxmlformats.org/presentationml/2006/main">
+  <p:cSld>
+    <p:spTree>
+      <p:nvGrpSpPr>
+        <p:cNvPr id="1" name=""/>
+        <p:cNvGrpSpPr/>
+        <p:nvPr/>
+      </p:nvGrpSpPr>
+      <p:grpSpPr>
+        <a:xfrm>
+          <a:off x="0" y="0"/>
+          <a:ext cx="0" cy="0"/>
+          <a:chOff x="0" y="0"/>
+          <a:chExt cx="0" cy="0"/>
+        </a:xfrm>
+      </p:grpSpPr>
+      <p:sp>
+        <p:nvSpPr>
+          <p:cNvPr id="2" name="Slide Image Placeholder 1"/>
+          <p:cNvSpPr>
+            <a:spLocks noGrp="1" noRot="1" noChangeAspect="1"/>
+          </p:cNvSpPr>
+          <p:nvPr>
+            <p:ph type="sldImg"/>
+          </p:nvPr>
+        </p:nvSpPr>
+        <p:spPr/>
+      </p:sp>
+      <p:sp>
+        <p:nvSpPr>
+          <p:cNvPr id="3" name="Notes Placeholder 2"/>
+          <p:cNvSpPr>
+            <a:spLocks noGrp="1"/>
+          </p:cNvSpPr>
+          <p:nvPr>
+            <p:ph type="body" idx="1"/>
+          </p:nvPr>
+        </p:nvSpPr>
+        <p:spPr/>
+        <p:txBody>
+          <a:bodyPr/>
+          <a:lstStyle/>
+          <a:p>
+            <a:pPr marL="0" marR="0" indent="0" algn="l" defTabSz="914400" rtl="0" eaLnBrk="1" fontAlgn="auto" latinLnBrk="0" hangingPunct="1">
+              <a:lnSpc>
+                <a:spcPct val="100000"/>
+              </a:lnSpc>
+              <a:spcBef>
+                <a:spcPts val="0"/>
+              </a:spcBef>
+              <a:spcAft>
+                <a:spcPts val="0"/>
+              </a:spcAft>
+              <a:buClrTx/>
+              <a:buSzTx/>
+              <a:buFontTx/>
+              <a:buNone/>
+              <a:tabLst/>
+              <a:defRPr/>
+            </a:pPr>
+            <a:r>
+              <a:rPr lang="en-US" sz="1200" b="0" i="0" kern="1200" dirty="0" smtClean="0">
+                <a:solidFill>
+                  <a:schemeClr val="tx1"/>
+                </a:solidFill>
+                <a:effectLst/>
+                <a:latin typeface="+mn-lt"/>
+                <a:ea typeface="+mn-ea"/>
+                <a:cs typeface="+mn-cs"/>
+              </a:rPr>
+              <a:t>Pylearn2 differs from </a:t>
+            </a:r>
+            <a:r>
+              <a:rPr lang="en-US" sz="1200" b="0" i="0" kern="1200" dirty="0" err="1" smtClean="0">
+                <a:solidFill>
+                  <a:schemeClr val="tx1"/>
+                </a:solidFill>
+                <a:effectLst/>
+                <a:latin typeface="+mn-lt"/>
+                <a:ea typeface="+mn-ea"/>
+                <a:cs typeface="+mn-cs"/>
+              </a:rPr>
+              <a:t>scikit</a:t>
+            </a:r>
+            <a:r>
+              <a:rPr lang="en-US" sz="1200" b="0" i="0" kern="1200" dirty="0" smtClean="0">
+                <a:solidFill>
+                  <a:schemeClr val="tx1"/>
+                </a:solidFill>
+                <a:effectLst/>
+                <a:latin typeface="+mn-lt"/>
+                <a:ea typeface="+mn-ea"/>
+                <a:cs typeface="+mn-cs"/>
+              </a:rPr>
+              <a:t>-learn in that Pylearn2 aims to provide great flexibility and make it possible for a researcher to do almost anything, while </a:t>
+            </a:r>
+            <a:r>
+              <a:rPr lang="en-US" sz="1200" b="0" i="0" kern="1200" dirty="0" err="1" smtClean="0">
+                <a:solidFill>
+                  <a:schemeClr val="tx1"/>
+                </a:solidFill>
+                <a:effectLst/>
+                <a:latin typeface="+mn-lt"/>
+                <a:ea typeface="+mn-ea"/>
+                <a:cs typeface="+mn-cs"/>
+              </a:rPr>
+              <a:t>scikit</a:t>
+            </a:r>
+            <a:r>
+              <a:rPr lang="en-US" sz="1200" b="0" i="0" kern="1200" dirty="0" smtClean="0">
+                <a:solidFill>
+                  <a:schemeClr val="tx1"/>
+                </a:solidFill>
+                <a:effectLst/>
+                <a:latin typeface="+mn-lt"/>
+                <a:ea typeface="+mn-ea"/>
+                <a:cs typeface="+mn-cs"/>
+              </a:rPr>
+              <a:t>-learn aims to work as a “black box” that can produce good results even if the user does not understand the </a:t>
+            </a:r>
+            <a:r>
+              <a:rPr lang="en-US" sz="1200" b="0" i="0" kern="1200" smtClean="0">
+                <a:solidFill>
+                  <a:schemeClr val="tx1"/>
+                </a:solidFill>
+                <a:effectLst/>
+                <a:latin typeface="+mn-lt"/>
+                <a:ea typeface="+mn-ea"/>
+                <a:cs typeface="+mn-cs"/>
+              </a:rPr>
+              <a:t>implementation</a:t>
+            </a:r>
+            <a:r>
+              <a:rPr lang="en-US" altLang="zh-CN" sz="1200" b="0" i="0" kern="1200" smtClean="0">
+                <a:solidFill>
+                  <a:schemeClr val="tx1"/>
+                </a:solidFill>
+                <a:effectLst/>
+                <a:latin typeface="+mn-lt"/>
+                <a:ea typeface="+mn-ea"/>
+                <a:cs typeface="+mn-cs"/>
+              </a:rPr>
+              <a:t>.</a:t>
+            </a:r>
+            <a:endParaRPr lang="en-US" sz="1200" b="0" i="0" kern="1200" smtClean="0">
+              <a:solidFill>
+                <a:schemeClr val="tx1"/>
+              </a:solidFill>
+              <a:effectLst/>
+              <a:latin typeface="+mn-lt"/>
+              <a:ea typeface="+mn-ea"/>
+              <a:cs typeface="+mn-cs"/>
+            </a:endParaRPr>
+          </a:p>
+        </p:txBody>
+      </p:sp>
+      <p:sp>
+        <p:nvSpPr>
+          <p:cNvPr id="4" name="Slide Number Placeholder 3"/>
+          <p:cNvSpPr>
+            <a:spLocks noGrp="1"/>
+          </p:cNvSpPr>
+          <p:nvPr>
+            <p:ph type="sldNum" sz="quarter" idx="10"/>
+          </p:nvPr>
+        </p:nvSpPr>
+        <p:spPr/>
+        <p:txBody>
+          <a:bodyPr/>
+          <a:lstStyle/>
+          <a:p>
+            <a:fld id="{4E51F73A-5F5A-9E4D-98D0-6CD6CE479A3B}" type="slidenum">
+              <a:rPr lang="en-US" smtClean="0"/>
+              <a:t>4</a:t>
+            </a:fld>
+            <a:endParaRPr lang="en-US"/>
+          </a:p>
+        </p:txBody>
+      </p:sp>
+    </p:spTree>
+    <p:extLst>
+      <p:ext uri="{BB962C8B-B14F-4D97-AF65-F5344CB8AC3E}">
+        <p14:creationId xmlns:p14="http://schemas.microsoft.com/office/powerpoint/2010/main" val="1823089412"/>
+      </p:ext>
+    </p:extLst>
+  </p:cSld>
+  <p:clrMapOvr>
+    <a:masterClrMapping/>
+  </p:clrMapOvr>
+</p:notes>
 </file>
 
 <file path=ppt/slideLayouts/slideLayout1.xml><?xml version="1.0" encoding="utf-8"?>
@@ -3049,6 +3608,285 @@
 </p:sld>
 </file>
 
+<file path=ppt/slides/slide10.xml><?xml version="1.0" encoding="utf-8"?>
+<p:sld xmlns:a="http://schemas.openxmlformats.org/drawingml/2006/main" xmlns:r="http://schemas.openxmlformats.org/officeDocument/2006/relationships" xmlns:p="http://schemas.openxmlformats.org/presentationml/2006/main">
+  <p:cSld>
+    <p:spTree>
+      <p:nvGrpSpPr>
+        <p:cNvPr id="1" name=""/>
+        <p:cNvGrpSpPr/>
+        <p:nvPr/>
+      </p:nvGrpSpPr>
+      <p:grpSpPr>
+        <a:xfrm>
+          <a:off x="0" y="0"/>
+          <a:ext cx="0" cy="0"/>
+          <a:chOff x="0" y="0"/>
+          <a:chExt cx="0" cy="0"/>
+        </a:xfrm>
+      </p:grpSpPr>
+      <p:sp>
+        <p:nvSpPr>
+          <p:cNvPr id="2" name="Title 1"/>
+          <p:cNvSpPr>
+            <a:spLocks noGrp="1"/>
+          </p:cNvSpPr>
+          <p:nvPr>
+            <p:ph type="title"/>
+          </p:nvPr>
+        </p:nvSpPr>
+        <p:spPr>
+          <a:xfrm>
+            <a:off x="628650" y="101882"/>
+            <a:ext cx="8404514" cy="909492"/>
+          </a:xfrm>
+        </p:spPr>
+        <p:txBody>
+          <a:bodyPr>
+            <a:normAutofit/>
+          </a:bodyPr>
+          <a:lstStyle/>
+          <a:p>
+            <a:r>
+              <a:rPr lang="en-US" sz="3600" dirty="0" smtClean="0">
+                <a:latin typeface="+mn-lt"/>
+              </a:rPr>
+              <a:t>Softmax Regression</a:t>
+            </a:r>
+            <a:endParaRPr lang="en-US" sz="3600" dirty="0">
+              <a:latin typeface="+mn-lt"/>
+            </a:endParaRPr>
+          </a:p>
+        </p:txBody>
+      </p:sp>
+      <p:sp>
+        <p:nvSpPr>
+          <p:cNvPr id="3" name="Content Placeholder 2"/>
+          <p:cNvSpPr>
+            <a:spLocks noGrp="1"/>
+          </p:cNvSpPr>
+          <p:nvPr>
+            <p:ph idx="1"/>
+          </p:nvPr>
+        </p:nvSpPr>
+        <p:spPr>
+          <a:xfrm>
+            <a:off x="628650" y="1136073"/>
+            <a:ext cx="8404514" cy="5611091"/>
+          </a:xfrm>
+        </p:spPr>
+        <p:txBody>
+          <a:bodyPr>
+            <a:normAutofit/>
+          </a:bodyPr>
+          <a:lstStyle/>
+          <a:p>
+            <a:endParaRPr lang="en-US" dirty="0"/>
+          </a:p>
+        </p:txBody>
+      </p:sp>
+    </p:spTree>
+    <p:extLst>
+      <p:ext uri="{BB962C8B-B14F-4D97-AF65-F5344CB8AC3E}">
+        <p14:creationId xmlns:p14="http://schemas.microsoft.com/office/powerpoint/2010/main" val="1455371254"/>
+      </p:ext>
+    </p:extLst>
+  </p:cSld>
+  <p:clrMapOvr>
+    <a:masterClrMapping/>
+  </p:clrMapOvr>
+  <p:timing>
+    <p:tnLst>
+      <p:par>
+        <p:cTn id="1" dur="indefinite" restart="never" nodeType="tmRoot"/>
+      </p:par>
+    </p:tnLst>
+  </p:timing>
+</p:sld>
+</file>
+
+<file path=ppt/slides/slide11.xml><?xml version="1.0" encoding="utf-8"?>
+<p:sld xmlns:a="http://schemas.openxmlformats.org/drawingml/2006/main" xmlns:r="http://schemas.openxmlformats.org/officeDocument/2006/relationships" xmlns:p="http://schemas.openxmlformats.org/presentationml/2006/main">
+  <p:cSld>
+    <p:spTree>
+      <p:nvGrpSpPr>
+        <p:cNvPr id="1" name=""/>
+        <p:cNvGrpSpPr/>
+        <p:nvPr/>
+      </p:nvGrpSpPr>
+      <p:grpSpPr>
+        <a:xfrm>
+          <a:off x="0" y="0"/>
+          <a:ext cx="0" cy="0"/>
+          <a:chOff x="0" y="0"/>
+          <a:chExt cx="0" cy="0"/>
+        </a:xfrm>
+      </p:grpSpPr>
+      <p:sp>
+        <p:nvSpPr>
+          <p:cNvPr id="2" name="Title 1"/>
+          <p:cNvSpPr>
+            <a:spLocks noGrp="1"/>
+          </p:cNvSpPr>
+          <p:nvPr>
+            <p:ph type="title"/>
+          </p:nvPr>
+        </p:nvSpPr>
+        <p:spPr>
+          <a:xfrm>
+            <a:off x="628650" y="101882"/>
+            <a:ext cx="8404514" cy="909492"/>
+          </a:xfrm>
+        </p:spPr>
+        <p:txBody>
+          <a:bodyPr>
+            <a:normAutofit/>
+          </a:bodyPr>
+          <a:lstStyle/>
+          <a:p>
+            <a:endParaRPr lang="en-US" sz="3600" dirty="0">
+              <a:latin typeface="+mn-lt"/>
+            </a:endParaRPr>
+          </a:p>
+        </p:txBody>
+      </p:sp>
+      <p:sp>
+        <p:nvSpPr>
+          <p:cNvPr id="3" name="Content Placeholder 2"/>
+          <p:cNvSpPr>
+            <a:spLocks noGrp="1"/>
+          </p:cNvSpPr>
+          <p:nvPr>
+            <p:ph idx="1"/>
+          </p:nvPr>
+        </p:nvSpPr>
+        <p:spPr>
+          <a:xfrm>
+            <a:off x="628650" y="1136073"/>
+            <a:ext cx="8404514" cy="5611091"/>
+          </a:xfrm>
+        </p:spPr>
+        <p:txBody>
+          <a:bodyPr>
+            <a:normAutofit/>
+          </a:bodyPr>
+          <a:lstStyle/>
+          <a:p>
+            <a:endParaRPr lang="en-US" dirty="0"/>
+          </a:p>
+        </p:txBody>
+      </p:sp>
+    </p:spTree>
+    <p:extLst>
+      <p:ext uri="{BB962C8B-B14F-4D97-AF65-F5344CB8AC3E}">
+        <p14:creationId xmlns:p14="http://schemas.microsoft.com/office/powerpoint/2010/main" val="1768794057"/>
+      </p:ext>
+    </p:extLst>
+  </p:cSld>
+  <p:clrMapOvr>
+    <a:masterClrMapping/>
+  </p:clrMapOvr>
+  <p:timing>
+    <p:tnLst>
+      <p:par>
+        <p:cTn id="1" dur="indefinite" restart="never" nodeType="tmRoot"/>
+      </p:par>
+    </p:tnLst>
+  </p:timing>
+</p:sld>
+</file>
+
+<file path=ppt/slides/slide12.xml><?xml version="1.0" encoding="utf-8"?>
+<p:sld xmlns:a="http://schemas.openxmlformats.org/drawingml/2006/main" xmlns:r="http://schemas.openxmlformats.org/officeDocument/2006/relationships" xmlns:p="http://schemas.openxmlformats.org/presentationml/2006/main">
+  <p:cSld>
+    <p:spTree>
+      <p:nvGrpSpPr>
+        <p:cNvPr id="1" name=""/>
+        <p:cNvGrpSpPr/>
+        <p:nvPr/>
+      </p:nvGrpSpPr>
+      <p:grpSpPr>
+        <a:xfrm>
+          <a:off x="0" y="0"/>
+          <a:ext cx="0" cy="0"/>
+          <a:chOff x="0" y="0"/>
+          <a:chExt cx="0" cy="0"/>
+        </a:xfrm>
+      </p:grpSpPr>
+      <p:sp>
+        <p:nvSpPr>
+          <p:cNvPr id="2" name="Title 1"/>
+          <p:cNvSpPr>
+            <a:spLocks noGrp="1"/>
+          </p:cNvSpPr>
+          <p:nvPr>
+            <p:ph type="title"/>
+          </p:nvPr>
+        </p:nvSpPr>
+        <p:spPr>
+          <a:xfrm>
+            <a:off x="628650" y="101882"/>
+            <a:ext cx="8404514" cy="909492"/>
+          </a:xfrm>
+        </p:spPr>
+        <p:txBody>
+          <a:bodyPr>
+            <a:normAutofit/>
+          </a:bodyPr>
+          <a:lstStyle/>
+          <a:p>
+            <a:endParaRPr lang="en-US" sz="3600" dirty="0">
+              <a:latin typeface="+mn-lt"/>
+            </a:endParaRPr>
+          </a:p>
+        </p:txBody>
+      </p:sp>
+      <p:sp>
+        <p:nvSpPr>
+          <p:cNvPr id="3" name="Content Placeholder 2"/>
+          <p:cNvSpPr>
+            <a:spLocks noGrp="1"/>
+          </p:cNvSpPr>
+          <p:nvPr>
+            <p:ph idx="1"/>
+          </p:nvPr>
+        </p:nvSpPr>
+        <p:spPr>
+          <a:xfrm>
+            <a:off x="628650" y="1136073"/>
+            <a:ext cx="8404514" cy="5611091"/>
+          </a:xfrm>
+        </p:spPr>
+        <p:txBody>
+          <a:bodyPr>
+            <a:normAutofit/>
+          </a:bodyPr>
+          <a:lstStyle/>
+          <a:p>
+            <a:endParaRPr lang="en-US" dirty="0"/>
+          </a:p>
+        </p:txBody>
+      </p:sp>
+    </p:spTree>
+    <p:extLst>
+      <p:ext uri="{BB962C8B-B14F-4D97-AF65-F5344CB8AC3E}">
+        <p14:creationId xmlns:p14="http://schemas.microsoft.com/office/powerpoint/2010/main" val="251243823"/>
+      </p:ext>
+    </p:extLst>
+  </p:cSld>
+  <p:clrMapOvr>
+    <a:masterClrMapping/>
+  </p:clrMapOvr>
+  <p:timing>
+    <p:tnLst>
+      <p:par>
+        <p:cTn id="1" dur="indefinite" restart="never" nodeType="tmRoot"/>
+      </p:par>
+    </p:tnLst>
+  </p:timing>
+</p:sld>
+</file>
+
 <file path=ppt/slides/slide2.xml><?xml version="1.0" encoding="utf-8"?>
 <p:sld xmlns:a="http://schemas.openxmlformats.org/drawingml/2006/main" xmlns:r="http://schemas.openxmlformats.org/officeDocument/2006/relationships" xmlns:p="http://schemas.openxmlformats.org/presentationml/2006/main">
   <p:cSld>
@@ -3277,7 +4115,7 @@
         <p:spPr>
           <a:xfrm>
             <a:off x="628650" y="101882"/>
-            <a:ext cx="7886700" cy="909492"/>
+            <a:ext cx="8404514" cy="909492"/>
           </a:xfrm>
         </p:spPr>
         <p:txBody>
@@ -3286,6 +4124,36 @@
           </a:bodyPr>
           <a:lstStyle/>
           <a:p>
+            <a:r>
+              <a:rPr lang="en-US" altLang="zh-CN" sz="3600" dirty="0" smtClean="0">
+                <a:latin typeface="+mn-lt"/>
+              </a:rPr>
+              <a:t>Introduction</a:t>
+            </a:r>
+            <a:r>
+              <a:rPr lang="zh-CN" altLang="en-US" sz="3600" dirty="0" smtClean="0">
+                <a:latin typeface="+mn-lt"/>
+              </a:rPr>
+              <a:t> </a:t>
+            </a:r>
+            <a:r>
+              <a:rPr lang="en-US" altLang="zh-CN" sz="3600" dirty="0" smtClean="0">
+                <a:latin typeface="+mn-lt"/>
+              </a:rPr>
+              <a:t>to</a:t>
+            </a:r>
+            <a:r>
+              <a:rPr lang="zh-CN" altLang="en-US" sz="3600" dirty="0" smtClean="0">
+                <a:latin typeface="+mn-lt"/>
+              </a:rPr>
+              <a:t> </a:t>
+            </a:r>
+            <a:r>
+              <a:rPr lang="en-US" altLang="zh-CN" sz="3600" dirty="0" smtClean="0">
+                <a:latin typeface="+mn-lt"/>
+              </a:rPr>
+              <a:t>Theano</a:t>
+            </a:r>
             <a:endParaRPr lang="en-US" sz="3600" dirty="0">
               <a:latin typeface="+mn-lt"/>
             </a:endParaRPr>
@@ -3314,10 +4182,352 @@
           </a:bodyPr>
           <a:lstStyle/>
           <a:p>
+            <a:r>
+              <a:rPr lang="en-US" altLang="zh-CN" dirty="0" smtClean="0"/>
+              <a:t>Theano</a:t>
+            </a:r>
+            <a:r>
+              <a:rPr lang="zh-CN" altLang="en-US" dirty="0" smtClean="0"/>
+              <a:t> </a:t>
+            </a:r>
+            <a:r>
+              <a:rPr lang="en-US" altLang="zh-CN" dirty="0" smtClean="0"/>
+              <a:t>is</a:t>
+            </a:r>
+            <a:r>
+              <a:rPr lang="zh-CN" altLang="en-US" dirty="0" smtClean="0"/>
+              <a:t> </a:t>
+            </a:r>
+            <a:r>
+              <a:rPr lang="en-US" altLang="zh-CN" dirty="0" smtClean="0"/>
+              <a:t>Python</a:t>
+            </a:r>
+            <a:r>
+              <a:rPr lang="zh-CN" altLang="en-US" dirty="0" smtClean="0"/>
+              <a:t> </a:t>
+            </a:r>
+            <a:r>
+              <a:rPr lang="en-US" altLang="zh-CN" dirty="0" smtClean="0"/>
+              <a:t>library</a:t>
+            </a:r>
+            <a:r>
+              <a:rPr lang="zh-CN" altLang="en-US" dirty="0" smtClean="0"/>
+              <a:t> </a:t>
+            </a:r>
+            <a:r>
+              <a:rPr lang="en-US" altLang="zh-CN" dirty="0" smtClean="0"/>
+              <a:t>that</a:t>
+            </a:r>
+            <a:r>
+              <a:rPr lang="zh-CN" altLang="en-US" dirty="0" smtClean="0"/>
+              <a:t> </a:t>
+            </a:r>
+            <a:r>
+              <a:rPr lang="en-US" altLang="zh-CN" dirty="0" smtClean="0"/>
+              <a:t>allows</a:t>
+            </a:r>
+            <a:r>
+              <a:rPr lang="zh-CN" altLang="en-US" dirty="0" smtClean="0"/>
+              <a:t> </a:t>
+            </a:r>
+            <a:r>
+              <a:rPr lang="en-US" altLang="zh-CN" dirty="0" smtClean="0"/>
+              <a:t>you</a:t>
+            </a:r>
+            <a:r>
+              <a:rPr lang="zh-CN" altLang="en-US" dirty="0" smtClean="0"/>
+              <a:t> </a:t>
+            </a:r>
+            <a:r>
+              <a:rPr lang="en-US" altLang="zh-CN" dirty="0" smtClean="0"/>
+              <a:t>to</a:t>
+            </a:r>
+            <a:r>
+              <a:rPr lang="zh-CN" altLang="en-US" dirty="0" smtClean="0"/>
+              <a:t> </a:t>
+            </a:r>
+            <a:r>
+              <a:rPr lang="en-US" altLang="zh-CN" dirty="0" smtClean="0"/>
+              <a:t>define,</a:t>
+            </a:r>
+            <a:r>
+              <a:rPr lang="zh-CN" altLang="en-US" dirty="0" smtClean="0"/>
+              <a:t> </a:t>
+            </a:r>
+            <a:r>
+              <a:rPr lang="en-US" altLang="zh-CN" dirty="0" smtClean="0"/>
+              <a:t>evaluate</a:t>
+            </a:r>
+            <a:r>
+              <a:rPr lang="zh-CN" altLang="en-US" dirty="0" smtClean="0"/>
+              <a:t> </a:t>
+            </a:r>
+            <a:r>
+              <a:rPr lang="en-US" altLang="zh-CN" dirty="0" smtClean="0"/>
+              <a:t>and</a:t>
+            </a:r>
+            <a:r>
+              <a:rPr lang="zh-CN" altLang="en-US" dirty="0" smtClean="0"/>
+              <a:t> </a:t>
+            </a:r>
+            <a:r>
+              <a:rPr lang="en-US" altLang="zh-CN" dirty="0" smtClean="0"/>
+              <a:t>optimize</a:t>
+            </a:r>
+            <a:r>
+              <a:rPr lang="zh-CN" altLang="en-US" dirty="0" smtClean="0"/>
+              <a:t> </a:t>
+            </a:r>
+            <a:r>
+              <a:rPr lang="en-US" altLang="zh-CN" dirty="0" smtClean="0"/>
+              <a:t>math</a:t>
+            </a:r>
+            <a:r>
+              <a:rPr lang="zh-CN" altLang="en-US" dirty="0" smtClean="0"/>
+              <a:t> </a:t>
+            </a:r>
+            <a:r>
+              <a:rPr lang="en-US" altLang="zh-CN" dirty="0" smtClean="0"/>
+              <a:t>expressions.</a:t>
+            </a:r>
+            <a:endParaRPr lang="zh-CN" altLang="en-US" dirty="0" smtClean="0"/>
+          </a:p>
+          <a:p>
+            <a:pPr lvl="1"/>
+            <a:r>
+              <a:rPr lang="en-US" altLang="zh-CN" dirty="0" smtClean="0"/>
+              <a:t>Efficient</a:t>
+            </a:r>
+            <a:r>
+              <a:rPr lang="zh-CN" altLang="en-US" dirty="0" smtClean="0"/>
+              <a:t> </a:t>
+            </a:r>
+            <a:r>
+              <a:rPr lang="en-US" altLang="zh-CN" dirty="0" smtClean="0"/>
+              <a:t>symbolic</a:t>
+            </a:r>
+            <a:r>
+              <a:rPr lang="zh-CN" altLang="en-US" dirty="0" smtClean="0"/>
+              <a:t> </a:t>
+            </a:r>
+            <a:r>
+              <a:rPr lang="en-US" altLang="zh-CN" dirty="0" smtClean="0"/>
+              <a:t>differentiation</a:t>
+            </a:r>
+            <a:endParaRPr lang="zh-CN" altLang="en-US" dirty="0" smtClean="0"/>
+          </a:p>
+          <a:p>
+            <a:pPr lvl="1"/>
+            <a:r>
+              <a:rPr lang="en-US" altLang="zh-CN" dirty="0" smtClean="0"/>
+              <a:t>Efficient</a:t>
+            </a:r>
+            <a:r>
+              <a:rPr lang="zh-CN" altLang="en-US" dirty="0" smtClean="0"/>
+              <a:t> </a:t>
+            </a:r>
+            <a:r>
+              <a:rPr lang="en-US" altLang="zh-CN" dirty="0" smtClean="0"/>
+              <a:t>handling</a:t>
+            </a:r>
+            <a:r>
+              <a:rPr lang="zh-CN" altLang="en-US" dirty="0" smtClean="0"/>
+              <a:t> </a:t>
+            </a:r>
+            <a:r>
+              <a:rPr lang="en-US" altLang="zh-CN" dirty="0" smtClean="0"/>
+              <a:t>of</a:t>
+            </a:r>
+            <a:r>
+              <a:rPr lang="zh-CN" altLang="en-US" dirty="0"/>
+              <a:t> </a:t>
+            </a:r>
+            <a:r>
+              <a:rPr lang="en-US" altLang="zh-CN" dirty="0" smtClean="0"/>
+              <a:t>matrices</a:t>
+            </a:r>
+            <a:endParaRPr lang="zh-CN" altLang="en-US" dirty="0" smtClean="0"/>
+          </a:p>
+          <a:p>
+            <a:pPr lvl="1"/>
+            <a:r>
+              <a:rPr lang="en-US" altLang="zh-CN" dirty="0" smtClean="0"/>
+              <a:t>Tight</a:t>
+            </a:r>
+            <a:r>
+              <a:rPr lang="zh-CN" altLang="en-US" dirty="0" smtClean="0"/>
+              <a:t> </a:t>
+            </a:r>
+            <a:r>
+              <a:rPr lang="en-US" altLang="zh-CN" dirty="0"/>
+              <a:t>integration</a:t>
+            </a:r>
+            <a:r>
+              <a:rPr lang="zh-CN" altLang="en-US" dirty="0"/>
+              <a:t> </a:t>
+            </a:r>
+            <a:r>
+              <a:rPr lang="en-US" altLang="zh-CN" dirty="0"/>
+              <a:t>of</a:t>
+            </a:r>
+            <a:r>
+              <a:rPr lang="zh-CN" altLang="en-US" dirty="0"/>
+              <a:t> </a:t>
+            </a:r>
+            <a:r>
+              <a:rPr lang="en-US" altLang="zh-CN" dirty="0" smtClean="0"/>
+              <a:t>NumPy</a:t>
+            </a:r>
+            <a:endParaRPr lang="zh-CN" altLang="en-US" dirty="0" smtClean="0"/>
+          </a:p>
+          <a:p>
+            <a:pPr lvl="1"/>
+            <a:r>
+              <a:rPr lang="en-US" altLang="zh-CN" dirty="0"/>
+              <a:t>Dynamic</a:t>
+            </a:r>
+            <a:r>
+              <a:rPr lang="zh-CN" altLang="en-US" dirty="0"/>
+              <a:t> </a:t>
+            </a:r>
+            <a:r>
+              <a:rPr lang="en-US" altLang="zh-CN" dirty="0"/>
+              <a:t>C</a:t>
+            </a:r>
+            <a:r>
+              <a:rPr lang="zh-CN" altLang="en-US" dirty="0"/>
+              <a:t> </a:t>
+            </a:r>
+            <a:r>
+              <a:rPr lang="en-US" altLang="zh-CN" dirty="0"/>
+              <a:t>code</a:t>
+            </a:r>
+            <a:r>
+              <a:rPr lang="zh-CN" altLang="en-US" dirty="0"/>
+              <a:t> </a:t>
+            </a:r>
+            <a:r>
+              <a:rPr lang="en-US" altLang="zh-CN" dirty="0"/>
+              <a:t>generate</a:t>
+            </a:r>
+            <a:endParaRPr lang="zh-CN" altLang="en-US" dirty="0"/>
+          </a:p>
+          <a:p>
+            <a:pPr lvl="1"/>
+            <a:r>
+              <a:rPr lang="en-US" altLang="zh-CN" dirty="0"/>
+              <a:t>Transparent</a:t>
+            </a:r>
+            <a:r>
+              <a:rPr lang="zh-CN" altLang="en-US" dirty="0"/>
+              <a:t> </a:t>
+            </a:r>
+            <a:r>
+              <a:rPr lang="en-US" altLang="zh-CN" dirty="0"/>
+              <a:t>use</a:t>
+            </a:r>
+            <a:r>
+              <a:rPr lang="zh-CN" altLang="en-US" dirty="0"/>
+              <a:t> </a:t>
+            </a:r>
+            <a:r>
+              <a:rPr lang="en-US" altLang="zh-CN" dirty="0"/>
+              <a:t>of</a:t>
+            </a:r>
+            <a:r>
+              <a:rPr lang="zh-CN" altLang="en-US" dirty="0"/>
+              <a:t> </a:t>
+            </a:r>
+            <a:r>
+              <a:rPr lang="en-US" altLang="zh-CN" dirty="0"/>
+              <a:t>GPU</a:t>
+            </a:r>
+            <a:endParaRPr lang="zh-CN" altLang="en-US" dirty="0"/>
+          </a:p>
+          <a:p>
+            <a:pPr lvl="1"/>
+            <a:endParaRPr lang="zh-CN" altLang="en-US" dirty="0" smtClean="0"/>
+          </a:p>
+          <a:p>
+            <a:pPr lvl="1"/>
             <a:endParaRPr lang="en-US" dirty="0"/>
           </a:p>
         </p:txBody>
       </p:sp>
+      <p:sp>
+        <p:nvSpPr>
+          <p:cNvPr id="5" name="Rounded Rectangle 4"/>
+          <p:cNvSpPr/>
+          <p:nvPr/>
+        </p:nvSpPr>
+        <p:spPr>
+          <a:xfrm>
+            <a:off x="628650" y="4881967"/>
+            <a:ext cx="2471011" cy="929898"/>
+          </a:xfrm>
+          <a:prstGeom prst="roundRect">
+            <a:avLst/>
+          </a:prstGeom>
+        </p:spPr>
+        <p:style>
+          <a:lnRef idx="2">
+            <a:schemeClr val="accent1">
+              <a:shade val="50000"/>
+            </a:schemeClr>
+          </a:lnRef>
+          <a:fillRef idx="1">
+            <a:schemeClr val="accent1"/>
+          </a:fillRef>
+          <a:effectRef idx="0">
+            <a:schemeClr val="accent1"/>
+          </a:effectRef>
+          <a:fontRef idx="minor">
+            <a:schemeClr val="lt1"/>
+          </a:fontRef>
+        </p:style>
+        <p:txBody>
+          <a:bodyPr rtlCol="0" anchor="ctr"/>
+          <a:lstStyle/>
+          <a:p>
+            <a:pPr algn="ctr"/>
+            <a:r>
+              <a:rPr lang="en-US" dirty="0" smtClean="0"/>
+              <a:t>Symbolic programming</a:t>
+            </a:r>
+            <a:endParaRPr lang="en-US" dirty="0"/>
+          </a:p>
+        </p:txBody>
+      </p:sp>
+      <p:pic>
+        <p:nvPicPr>
+          <p:cNvPr id="6" name="Picture 5"/>
+          <p:cNvPicPr>
+            <a:picLocks noChangeAspect="1"/>
+          </p:cNvPicPr>
+          <p:nvPr/>
+        </p:nvPicPr>
+        <p:blipFill>
+          <a:blip r:embed="rId2">
+            <a:extLst>
+              <a:ext uri="{28A0092B-C50C-407E-A947-70E740481C1C}">
+                <a14:useLocalDpi xmlns:a14="http://schemas.microsoft.com/office/drawing/2010/main" val="0"/>
+              </a:ext>
+            </a:extLst>
+          </a:blip>
+          <a:stretch>
+            <a:fillRect/>
+          </a:stretch>
+        </p:blipFill>
+        <p:spPr>
+          <a:xfrm>
+            <a:off x="3947293" y="3903938"/>
+            <a:ext cx="4964232" cy="2967925"/>
+          </a:xfrm>
+          <a:prstGeom prst="rect">
+            <a:avLst/>
+          </a:prstGeom>
+        </p:spPr>
+      </p:pic>
     </p:spTree>
     <p:extLst>
       <p:ext uri="{BB962C8B-B14F-4D97-AF65-F5344CB8AC3E}">
@@ -3368,7 +4578,7 @@
         <p:spPr>
           <a:xfrm>
             <a:off x="628650" y="101882"/>
-            <a:ext cx="7886700" cy="909492"/>
+            <a:ext cx="8404514" cy="909492"/>
           </a:xfrm>
         </p:spPr>
         <p:txBody>
@@ -3377,6 +4587,48 @@
           </a:bodyPr>
           <a:lstStyle/>
           <a:p>
+            <a:r>
+              <a:rPr lang="en-US" altLang="zh-CN" sz="3600" dirty="0" smtClean="0">
+                <a:latin typeface="+mn-lt"/>
+              </a:rPr>
+              <a:t>Introduction</a:t>
+            </a:r>
+            <a:r>
+              <a:rPr lang="zh-CN" altLang="en-US" sz="3600" dirty="0" smtClean="0">
+                <a:latin typeface="+mn-lt"/>
+              </a:rPr>
+              <a:t> </a:t>
+            </a:r>
+            <a:r>
+              <a:rPr lang="en-US" altLang="zh-CN" sz="3600" dirty="0" smtClean="0">
+                <a:latin typeface="+mn-lt"/>
+              </a:rPr>
+              <a:t>to</a:t>
+            </a:r>
+            <a:r>
+              <a:rPr lang="zh-CN" altLang="en-US" sz="3600" dirty="0" smtClean="0">
+                <a:latin typeface="+mn-lt"/>
+              </a:rPr>
+              <a:t> </a:t>
+            </a:r>
+            <a:r>
+              <a:rPr lang="en-US" altLang="zh-CN" sz="3600" dirty="0" smtClean="0">
+                <a:latin typeface="+mn-lt"/>
+              </a:rPr>
+              <a:t>Theano</a:t>
+            </a:r>
+            <a:r>
+              <a:rPr lang="zh-CN" altLang="en-US" sz="3600" dirty="0" smtClean="0">
+                <a:latin typeface="+mn-lt"/>
+              </a:rPr>
+              <a:t> </a:t>
+            </a:r>
+            <a:r>
+              <a:rPr lang="en-US" altLang="zh-CN" sz="3600" dirty="0" smtClean="0">
+                <a:latin typeface="+mn-lt"/>
+              </a:rPr>
+              <a:t>(cont.)</a:t>
+            </a:r>
             <a:endParaRPr lang="en-US" sz="3600" dirty="0">
               <a:latin typeface="+mn-lt"/>
             </a:endParaRPr>
@@ -3405,6 +4657,351 @@
           </a:bodyPr>
           <a:lstStyle/>
           <a:p>
+            <a:r>
+              <a:rPr lang="en-US" altLang="zh-CN" dirty="0"/>
+              <a:t>M</a:t>
+            </a:r>
+            <a:r>
+              <a:rPr lang="en-US" altLang="zh-CN" dirty="0" smtClean="0"/>
+              <a:t>achine</a:t>
+            </a:r>
+            <a:r>
+              <a:rPr lang="zh-CN" altLang="en-US" dirty="0" smtClean="0"/>
+              <a:t> </a:t>
+            </a:r>
+            <a:r>
+              <a:rPr lang="en-US" altLang="zh-CN" dirty="0" smtClean="0"/>
+              <a:t>learning</a:t>
+            </a:r>
+            <a:r>
+              <a:rPr lang="zh-CN" altLang="en-US" dirty="0" smtClean="0"/>
+              <a:t> </a:t>
+            </a:r>
+            <a:r>
+              <a:rPr lang="en-US" altLang="zh-CN" dirty="0" smtClean="0"/>
+              <a:t>libraries</a:t>
+            </a:r>
+            <a:r>
+              <a:rPr lang="zh-CN" altLang="en-US" dirty="0" smtClean="0"/>
+              <a:t> </a:t>
+            </a:r>
+            <a:r>
+              <a:rPr lang="en-US" altLang="zh-CN" dirty="0" smtClean="0"/>
+              <a:t>built</a:t>
+            </a:r>
+            <a:r>
+              <a:rPr lang="zh-CN" altLang="en-US" dirty="0" smtClean="0"/>
+              <a:t> </a:t>
+            </a:r>
+            <a:r>
+              <a:rPr lang="en-US" altLang="zh-CN" dirty="0" smtClean="0"/>
+              <a:t>on</a:t>
+            </a:r>
+            <a:r>
+              <a:rPr lang="zh-CN" altLang="en-US" dirty="0" smtClean="0"/>
+              <a:t> </a:t>
+            </a:r>
+            <a:r>
+              <a:rPr lang="en-US" altLang="zh-CN" dirty="0" smtClean="0"/>
+              <a:t>top</a:t>
+            </a:r>
+            <a:r>
+              <a:rPr lang="zh-CN" altLang="en-US" dirty="0" smtClean="0"/>
+              <a:t> </a:t>
+            </a:r>
+            <a:r>
+              <a:rPr lang="en-US" altLang="zh-CN" dirty="0" smtClean="0"/>
+              <a:t>of</a:t>
+            </a:r>
+            <a:r>
+              <a:rPr lang="zh-CN" altLang="en-US" dirty="0" smtClean="0"/>
+              <a:t> </a:t>
+            </a:r>
+            <a:r>
+              <a:rPr lang="en-US" altLang="zh-CN" dirty="0" smtClean="0"/>
+              <a:t>Theano</a:t>
+            </a:r>
+            <a:endParaRPr lang="zh-CN" altLang="en-US" dirty="0" smtClean="0"/>
+          </a:p>
+          <a:p>
+            <a:pPr lvl="1"/>
+            <a:r>
+              <a:rPr lang="en-US" altLang="zh-CN" dirty="0" smtClean="0"/>
+              <a:t>Pylearn2</a:t>
+            </a:r>
+          </a:p>
+          <a:p>
+            <a:pPr lvl="2"/>
+            <a:r>
+              <a:rPr lang="en-US" altLang="zh-CN" dirty="0" smtClean="0"/>
+              <a:t>g</a:t>
+            </a:r>
+            <a:r>
+              <a:rPr lang="en-US" altLang="zh-CN" dirty="0" smtClean="0"/>
+              <a:t>reat flexibility and a good choice for trying out ML ideas</a:t>
+            </a:r>
+          </a:p>
+          <a:p>
+            <a:pPr lvl="1"/>
+            <a:r>
+              <a:rPr lang="en-US" altLang="zh-CN" dirty="0" smtClean="0"/>
+              <a:t>PyMC3</a:t>
+            </a:r>
+          </a:p>
+          <a:p>
+            <a:pPr lvl="2"/>
+            <a:r>
+              <a:rPr lang="en-US" altLang="zh-CN" dirty="0" smtClean="0"/>
+              <a:t>Probabilistic programming; building statistical Bayesian models</a:t>
+            </a:r>
+          </a:p>
+          <a:p>
+            <a:pPr lvl="1"/>
+            <a:r>
+              <a:rPr lang="en-US" altLang="zh-CN" dirty="0" err="1"/>
+              <a:t>Sklearn</a:t>
+            </a:r>
+            <a:r>
+              <a:rPr lang="en-US" altLang="zh-CN" dirty="0"/>
+              <a:t>-theano</a:t>
+            </a:r>
+          </a:p>
+          <a:p>
+            <a:pPr lvl="2"/>
+            <a:r>
+              <a:rPr lang="en-US" altLang="zh-CN" dirty="0"/>
+              <a:t>Easy-to-use deep learning </a:t>
+            </a:r>
+            <a:r>
+              <a:rPr lang="en-US" altLang="zh-CN" dirty="0" smtClean="0"/>
+              <a:t>tool</a:t>
+            </a:r>
+          </a:p>
+          <a:p>
+            <a:pPr lvl="1"/>
+            <a:r>
+              <a:rPr lang="en-US" altLang="zh-CN" dirty="0" err="1" smtClean="0"/>
+              <a:t>Lasagne</a:t>
+            </a:r>
+            <a:endParaRPr lang="en-US" altLang="zh-CN" dirty="0" smtClean="0"/>
+          </a:p>
+          <a:p>
+            <a:pPr lvl="2"/>
+            <a:r>
+              <a:rPr lang="en-US" altLang="zh-CN" dirty="0" smtClean="0"/>
+              <a:t>Lightweight library to build neural networks</a:t>
+            </a:r>
+          </a:p>
+          <a:p>
+            <a:pPr lvl="2"/>
+            <a:endParaRPr lang="en-US" altLang="zh-CN" dirty="0" smtClean="0"/>
+          </a:p>
+          <a:p>
+            <a:pPr lvl="1"/>
+            <a:endParaRPr lang="zh-CN" altLang="en-US" dirty="0"/>
+          </a:p>
+          <a:p>
+            <a:pPr lvl="1"/>
+            <a:endParaRPr lang="zh-CN" altLang="en-US" dirty="0" smtClean="0"/>
+          </a:p>
+          <a:p>
+            <a:pPr lvl="1"/>
+            <a:endParaRPr lang="en-US" dirty="0"/>
+          </a:p>
+        </p:txBody>
+      </p:sp>
+    </p:spTree>
+    <p:extLst>
+      <p:ext uri="{BB962C8B-B14F-4D97-AF65-F5344CB8AC3E}">
+        <p14:creationId xmlns:p14="http://schemas.microsoft.com/office/powerpoint/2010/main" val="112805732"/>
+      </p:ext>
+    </p:extLst>
+  </p:cSld>
+  <p:clrMapOvr>
+    <a:masterClrMapping/>
+  </p:clrMapOvr>
+  <p:timing>
+    <p:tnLst>
+      <p:par>
+        <p:cTn id="1" dur="indefinite" restart="never" nodeType="tmRoot"/>
+      </p:par>
+    </p:tnLst>
+  </p:timing>
+</p:sld>
+</file>
+
+<file path=ppt/slides/slide5.xml><?xml version="1.0" encoding="utf-8"?>
+<p:sld xmlns:a="http://schemas.openxmlformats.org/drawingml/2006/main" xmlns:r="http://schemas.openxmlformats.org/officeDocument/2006/relationships" xmlns:p="http://schemas.openxmlformats.org/presentationml/2006/main">
+  <p:cSld>
+    <p:spTree>
+      <p:nvGrpSpPr>
+        <p:cNvPr id="1" name=""/>
+        <p:cNvGrpSpPr/>
+        <p:nvPr/>
+      </p:nvGrpSpPr>
+      <p:grpSpPr>
+        <a:xfrm>
+          <a:off x="0" y="0"/>
+          <a:ext cx="0" cy="0"/>
+          <a:chOff x="0" y="0"/>
+          <a:chExt cx="0" cy="0"/>
+        </a:xfrm>
+      </p:grpSpPr>
+      <p:sp>
+        <p:nvSpPr>
+          <p:cNvPr id="2" name="Title 1"/>
+          <p:cNvSpPr>
+            <a:spLocks noGrp="1"/>
+          </p:cNvSpPr>
+          <p:nvPr>
+            <p:ph type="title"/>
+          </p:nvPr>
+        </p:nvSpPr>
+        <p:spPr>
+          <a:xfrm>
+            <a:off x="628650" y="101882"/>
+            <a:ext cx="8404514" cy="909492"/>
+          </a:xfrm>
+        </p:spPr>
+        <p:txBody>
+          <a:bodyPr>
+            <a:normAutofit/>
+          </a:bodyPr>
+          <a:lstStyle/>
+          <a:p>
+            <a:r>
+              <a:rPr lang="en-US" altLang="zh-CN" sz="3600" dirty="0">
+                <a:latin typeface="+mn-lt"/>
+              </a:rPr>
+              <a:t>Introduction</a:t>
+            </a:r>
+            <a:r>
+              <a:rPr lang="zh-CN" altLang="en-US" sz="3600" dirty="0">
+                <a:latin typeface="+mn-lt"/>
+              </a:rPr>
+              <a:t> </a:t>
+            </a:r>
+            <a:r>
+              <a:rPr lang="en-US" altLang="zh-CN" sz="3600" dirty="0">
+                <a:latin typeface="+mn-lt"/>
+              </a:rPr>
+              <a:t>to</a:t>
+            </a:r>
+            <a:r>
+              <a:rPr lang="zh-CN" altLang="en-US" sz="3600" dirty="0">
+                <a:latin typeface="+mn-lt"/>
+              </a:rPr>
+              <a:t> </a:t>
+            </a:r>
+            <a:r>
+              <a:rPr lang="en-US" altLang="zh-CN" sz="3600" dirty="0">
+                <a:latin typeface="+mn-lt"/>
+              </a:rPr>
+              <a:t>Theano</a:t>
+            </a:r>
+            <a:r>
+              <a:rPr lang="zh-CN" altLang="en-US" sz="3600" dirty="0">
+                <a:latin typeface="+mn-lt"/>
+              </a:rPr>
+              <a:t> </a:t>
+            </a:r>
+            <a:r>
+              <a:rPr lang="en-US" altLang="zh-CN" sz="3600" dirty="0">
+                <a:latin typeface="+mn-lt"/>
+              </a:rPr>
+              <a:t>(cont.)</a:t>
+            </a:r>
+            <a:endParaRPr lang="en-US" sz="3600" dirty="0">
+              <a:latin typeface="+mn-lt"/>
+            </a:endParaRPr>
+          </a:p>
+        </p:txBody>
+      </p:sp>
+      <p:sp>
+        <p:nvSpPr>
+          <p:cNvPr id="3" name="Content Placeholder 2"/>
+          <p:cNvSpPr>
+            <a:spLocks noGrp="1"/>
+          </p:cNvSpPr>
+          <p:nvPr>
+            <p:ph idx="1"/>
+          </p:nvPr>
+        </p:nvSpPr>
+        <p:spPr>
+          <a:xfrm>
+            <a:off x="628650" y="1136073"/>
+            <a:ext cx="8404514" cy="5611091"/>
+          </a:xfrm>
+        </p:spPr>
+        <p:txBody>
+          <a:bodyPr>
+            <a:normAutofit/>
+          </a:bodyPr>
+          <a:lstStyle/>
+          <a:p>
+            <a:r>
+              <a:rPr lang="en-US" dirty="0" smtClean="0"/>
+              <a:t>Models that have been built with Theano</a:t>
+            </a:r>
+          </a:p>
+          <a:p>
+            <a:pPr lvl="1"/>
+            <a:r>
+              <a:rPr lang="en-US" dirty="0" smtClean="0"/>
+              <a:t>Neural networks</a:t>
+            </a:r>
+          </a:p>
+          <a:p>
+            <a:pPr lvl="1"/>
+            <a:r>
+              <a:rPr lang="en-US" dirty="0" smtClean="0"/>
+              <a:t>Convolutional Neural Networks (CNN)</a:t>
+            </a:r>
+          </a:p>
+          <a:p>
+            <a:pPr lvl="1"/>
+            <a:r>
+              <a:rPr lang="en-US" dirty="0" smtClean="0"/>
+              <a:t>Recurrent Neural Networks (RNN)</a:t>
+            </a:r>
+          </a:p>
+          <a:p>
+            <a:pPr lvl="1"/>
+            <a:r>
+              <a:rPr lang="en-US" dirty="0" smtClean="0"/>
+              <a:t>Lone Short Term Memory (LSTM)</a:t>
+            </a:r>
+          </a:p>
+          <a:p>
+            <a:pPr lvl="1"/>
+            <a:r>
+              <a:rPr lang="en-US" dirty="0" err="1" smtClean="0"/>
+              <a:t>Autoencoders</a:t>
+            </a:r>
+            <a:endParaRPr lang="en-US" dirty="0" smtClean="0"/>
+          </a:p>
+          <a:p>
+            <a:pPr lvl="1"/>
+            <a:r>
+              <a:rPr lang="en-US" dirty="0" err="1" smtClean="0"/>
+              <a:t>GoogLeNet</a:t>
+            </a:r>
+            <a:endParaRPr lang="en-US" dirty="0"/>
+          </a:p>
+          <a:p>
+            <a:pPr lvl="1"/>
+            <a:r>
+              <a:rPr lang="en-US" dirty="0" err="1" smtClean="0"/>
+              <a:t>Overfeat</a:t>
+            </a:r>
+            <a:endParaRPr lang="en-US" dirty="0" smtClean="0"/>
+          </a:p>
+          <a:p>
+            <a:pPr lvl="1"/>
+            <a:r>
+              <a:rPr lang="en-US" dirty="0" smtClean="0"/>
+              <a:t>…</a:t>
+            </a:r>
             <a:endParaRPr lang="en-US" dirty="0"/>
           </a:p>
         </p:txBody>
@@ -3413,6 +5010,2138 @@
     <p:extLst>
       <p:ext uri="{BB962C8B-B14F-4D97-AF65-F5344CB8AC3E}">
         <p14:creationId xmlns:p14="http://schemas.microsoft.com/office/powerpoint/2010/main" val="1909850543"/>
+      </p:ext>
+    </p:extLst>
+  </p:cSld>
+  <p:clrMapOvr>
+    <a:masterClrMapping/>
+  </p:clrMapOvr>
+  <p:timing>
+    <p:tnLst>
+      <p:par>
+        <p:cTn id="1" dur="indefinite" restart="never" nodeType="tmRoot"/>
+      </p:par>
+    </p:tnLst>
+  </p:timing>
+</p:sld>
+</file>
+
+<file path=ppt/slides/slide6.xml><?xml version="1.0" encoding="utf-8"?>
+<p:sld xmlns:a="http://schemas.openxmlformats.org/drawingml/2006/main" xmlns:r="http://schemas.openxmlformats.org/officeDocument/2006/relationships" xmlns:p="http://schemas.openxmlformats.org/presentationml/2006/main">
+  <p:cSld>
+    <p:spTree>
+      <p:nvGrpSpPr>
+        <p:cNvPr id="1" name=""/>
+        <p:cNvGrpSpPr/>
+        <p:nvPr/>
+      </p:nvGrpSpPr>
+      <p:grpSpPr>
+        <a:xfrm>
+          <a:off x="0" y="0"/>
+          <a:ext cx="0" cy="0"/>
+          <a:chOff x="0" y="0"/>
+          <a:chExt cx="0" cy="0"/>
+        </a:xfrm>
+      </p:grpSpPr>
+      <p:sp>
+        <p:nvSpPr>
+          <p:cNvPr id="2" name="Title 1"/>
+          <p:cNvSpPr>
+            <a:spLocks noGrp="1"/>
+          </p:cNvSpPr>
+          <p:nvPr>
+            <p:ph type="title"/>
+          </p:nvPr>
+        </p:nvSpPr>
+        <p:spPr>
+          <a:xfrm>
+            <a:off x="628650" y="101882"/>
+            <a:ext cx="8404514" cy="909492"/>
+          </a:xfrm>
+        </p:spPr>
+        <p:txBody>
+          <a:bodyPr>
+            <a:normAutofit/>
+          </a:bodyPr>
+          <a:lstStyle/>
+          <a:p>
+            <a:r>
+              <a:rPr lang="en-US" altLang="zh-CN" sz="3600" dirty="0">
+                <a:solidFill>
+                  <a:prstClr val="black"/>
+                </a:solidFill>
+                <a:latin typeface="Calibri" panose="020F0502020204030204"/>
+              </a:rPr>
+              <a:t>Introduction</a:t>
+            </a:r>
+            <a:r>
+              <a:rPr lang="zh-CN" altLang="en-US" sz="3600" dirty="0">
+                <a:solidFill>
+                  <a:prstClr val="black"/>
+                </a:solidFill>
+                <a:latin typeface="Calibri" panose="020F0502020204030204"/>
+              </a:rPr>
+              <a:t> </a:t>
+            </a:r>
+            <a:r>
+              <a:rPr lang="en-US" altLang="zh-CN" sz="3600" dirty="0">
+                <a:solidFill>
+                  <a:prstClr val="black"/>
+                </a:solidFill>
+                <a:latin typeface="Calibri" panose="020F0502020204030204"/>
+              </a:rPr>
+              <a:t>to</a:t>
+            </a:r>
+            <a:r>
+              <a:rPr lang="zh-CN" altLang="en-US" sz="3600" dirty="0">
+                <a:solidFill>
+                  <a:prstClr val="black"/>
+                </a:solidFill>
+                <a:latin typeface="Calibri" panose="020F0502020204030204"/>
+              </a:rPr>
+              <a:t> </a:t>
+            </a:r>
+            <a:r>
+              <a:rPr lang="en-US" altLang="zh-CN" sz="3600" dirty="0">
+                <a:solidFill>
+                  <a:prstClr val="black"/>
+                </a:solidFill>
+                <a:latin typeface="Calibri" panose="020F0502020204030204"/>
+              </a:rPr>
+              <a:t>Theano</a:t>
+            </a:r>
+            <a:r>
+              <a:rPr lang="zh-CN" altLang="en-US" sz="3600" dirty="0">
+                <a:solidFill>
+                  <a:prstClr val="black"/>
+                </a:solidFill>
+                <a:latin typeface="Calibri" panose="020F0502020204030204"/>
+              </a:rPr>
+              <a:t> </a:t>
+            </a:r>
+            <a:r>
+              <a:rPr lang="en-US" altLang="zh-CN" sz="3600" dirty="0">
+                <a:solidFill>
+                  <a:prstClr val="black"/>
+                </a:solidFill>
+                <a:latin typeface="Calibri" panose="020F0502020204030204"/>
+              </a:rPr>
+              <a:t>(cont.)</a:t>
+            </a:r>
+            <a:endParaRPr lang="en-US" sz="3600" dirty="0">
+              <a:latin typeface="+mn-lt"/>
+            </a:endParaRPr>
+          </a:p>
+        </p:txBody>
+      </p:sp>
+      <p:sp>
+        <p:nvSpPr>
+          <p:cNvPr id="3" name="Content Placeholder 2"/>
+          <p:cNvSpPr>
+            <a:spLocks noGrp="1"/>
+          </p:cNvSpPr>
+          <p:nvPr>
+            <p:ph idx="1"/>
+          </p:nvPr>
+        </p:nvSpPr>
+        <p:spPr>
+          <a:xfrm>
+            <a:off x="628650" y="1136073"/>
+            <a:ext cx="8404514" cy="5611091"/>
+          </a:xfrm>
+        </p:spPr>
+        <p:txBody>
+          <a:bodyPr>
+            <a:normAutofit/>
+          </a:bodyPr>
+          <a:lstStyle/>
+          <a:p>
+            <a:r>
+              <a:rPr lang="en-US" dirty="0" smtClean="0"/>
+              <a:t>Symbolic variables in Theano</a:t>
+            </a:r>
+          </a:p>
+          <a:p>
+            <a:pPr lvl="1"/>
+            <a:r>
+              <a:rPr lang="en-US" dirty="0" smtClean="0"/>
+              <a:t>Variable (C, Java, Python, etc.)</a:t>
+            </a:r>
+          </a:p>
+          <a:p>
+            <a:pPr lvl="2"/>
+            <a:r>
+              <a:rPr lang="en-US" dirty="0" smtClean="0"/>
+              <a:t>A segment of physical storage in RAM</a:t>
+            </a:r>
+          </a:p>
+          <a:p>
+            <a:pPr lvl="2"/>
+            <a:r>
+              <a:rPr lang="en-US" dirty="0" smtClean="0"/>
+              <a:t>Operations are based on value passing between variables</a:t>
+            </a:r>
+          </a:p>
+          <a:p>
+            <a:pPr lvl="1"/>
+            <a:r>
+              <a:rPr lang="en-US" dirty="0" smtClean="0"/>
+              <a:t>Tensor (Theano)</a:t>
+            </a:r>
+          </a:p>
+          <a:p>
+            <a:pPr lvl="2"/>
+            <a:r>
+              <a:rPr lang="en-US" dirty="0" smtClean="0"/>
+              <a:t>A mathematical symbol</a:t>
+            </a:r>
+          </a:p>
+          <a:p>
+            <a:pPr lvl="2"/>
+            <a:r>
+              <a:rPr lang="en-US" dirty="0" smtClean="0"/>
+              <a:t>No physical storage in RAM to hold its value</a:t>
+            </a:r>
+          </a:p>
+          <a:p>
+            <a:pPr lvl="2"/>
+            <a:r>
+              <a:rPr lang="en-US" dirty="0" smtClean="0"/>
+              <a:t>Operations are actually building connections between tensors</a:t>
+            </a:r>
+          </a:p>
+          <a:p>
+            <a:pPr lvl="1"/>
+            <a:r>
+              <a:rPr lang="en-US" dirty="0" smtClean="0"/>
+              <a:t>Shared variable (Theano)</a:t>
+            </a:r>
+          </a:p>
+          <a:p>
+            <a:pPr lvl="2"/>
+            <a:r>
+              <a:rPr lang="en-US" dirty="0" smtClean="0"/>
+              <a:t>Hybrid of variable and tensor</a:t>
+            </a:r>
+          </a:p>
+          <a:p>
+            <a:pPr lvl="2"/>
+            <a:r>
+              <a:rPr lang="en-US" dirty="0" smtClean="0"/>
+              <a:t>Tensor with physical storage in RAM to hold its value</a:t>
+            </a:r>
+          </a:p>
+        </p:txBody>
+      </p:sp>
+    </p:spTree>
+    <p:extLst>
+      <p:ext uri="{BB962C8B-B14F-4D97-AF65-F5344CB8AC3E}">
+        <p14:creationId xmlns:p14="http://schemas.microsoft.com/office/powerpoint/2010/main" val="420687483"/>
+      </p:ext>
+    </p:extLst>
+  </p:cSld>
+  <p:clrMapOvr>
+    <a:masterClrMapping/>
+  </p:clrMapOvr>
+  <p:timing>
+    <p:tnLst>
+      <p:par>
+        <p:cTn id="1" dur="indefinite" restart="never" nodeType="tmRoot"/>
+      </p:par>
+    </p:tnLst>
+  </p:timing>
+</p:sld>
+</file>
+
+<file path=ppt/slides/slide7.xml><?xml version="1.0" encoding="utf-8"?>
+<p:sld xmlns:a="http://schemas.openxmlformats.org/drawingml/2006/main" xmlns:r="http://schemas.openxmlformats.org/officeDocument/2006/relationships" xmlns:p="http://schemas.openxmlformats.org/presentationml/2006/main">
+  <p:cSld>
+    <p:spTree>
+      <p:nvGrpSpPr>
+        <p:cNvPr id="1" name=""/>
+        <p:cNvGrpSpPr/>
+        <p:nvPr/>
+      </p:nvGrpSpPr>
+      <p:grpSpPr>
+        <a:xfrm>
+          <a:off x="0" y="0"/>
+          <a:ext cx="0" cy="0"/>
+          <a:chOff x="0" y="0"/>
+          <a:chExt cx="0" cy="0"/>
+        </a:xfrm>
+      </p:grpSpPr>
+      <p:pic>
+        <p:nvPicPr>
+          <p:cNvPr id="10" name="Picture 9"/>
+          <p:cNvPicPr>
+            <a:picLocks noChangeAspect="1"/>
+          </p:cNvPicPr>
+          <p:nvPr/>
+        </p:nvPicPr>
+        <p:blipFill>
+          <a:blip r:embed="rId2">
+            <a:extLst>
+              <a:ext uri="{28A0092B-C50C-407E-A947-70E740481C1C}">
+                <a14:useLocalDpi xmlns:a14="http://schemas.microsoft.com/office/drawing/2010/main" val="0"/>
+              </a:ext>
+            </a:extLst>
+          </a:blip>
+          <a:stretch>
+            <a:fillRect/>
+          </a:stretch>
+        </p:blipFill>
+        <p:spPr>
+          <a:xfrm>
+            <a:off x="4397664" y="2265221"/>
+            <a:ext cx="4635500" cy="3657600"/>
+          </a:xfrm>
+          <a:prstGeom prst="rect">
+            <a:avLst/>
+          </a:prstGeom>
+        </p:spPr>
+      </p:pic>
+      <p:sp>
+        <p:nvSpPr>
+          <p:cNvPr id="2" name="Title 1"/>
+          <p:cNvSpPr>
+            <a:spLocks noGrp="1"/>
+          </p:cNvSpPr>
+          <p:nvPr>
+            <p:ph type="title"/>
+          </p:nvPr>
+        </p:nvSpPr>
+        <p:spPr>
+          <a:xfrm>
+            <a:off x="628650" y="101882"/>
+            <a:ext cx="8404514" cy="909492"/>
+          </a:xfrm>
+        </p:spPr>
+        <p:txBody>
+          <a:bodyPr>
+            <a:normAutofit/>
+          </a:bodyPr>
+          <a:lstStyle/>
+          <a:p>
+            <a:r>
+              <a:rPr lang="en-US" altLang="zh-CN" sz="3600" dirty="0">
+                <a:solidFill>
+                  <a:prstClr val="black"/>
+                </a:solidFill>
+                <a:latin typeface="Calibri" panose="020F0502020204030204"/>
+              </a:rPr>
+              <a:t>Introduction</a:t>
+            </a:r>
+            <a:r>
+              <a:rPr lang="zh-CN" altLang="en-US" sz="3600" dirty="0">
+                <a:solidFill>
+                  <a:prstClr val="black"/>
+                </a:solidFill>
+                <a:latin typeface="Calibri" panose="020F0502020204030204"/>
+              </a:rPr>
+              <a:t> </a:t>
+            </a:r>
+            <a:r>
+              <a:rPr lang="en-US" altLang="zh-CN" sz="3600" dirty="0">
+                <a:solidFill>
+                  <a:prstClr val="black"/>
+                </a:solidFill>
+                <a:latin typeface="Calibri" panose="020F0502020204030204"/>
+              </a:rPr>
+              <a:t>to</a:t>
+            </a:r>
+            <a:r>
+              <a:rPr lang="zh-CN" altLang="en-US" sz="3600" dirty="0">
+                <a:solidFill>
+                  <a:prstClr val="black"/>
+                </a:solidFill>
+                <a:latin typeface="Calibri" panose="020F0502020204030204"/>
+              </a:rPr>
+              <a:t> </a:t>
+            </a:r>
+            <a:r>
+              <a:rPr lang="en-US" altLang="zh-CN" sz="3600" dirty="0">
+                <a:solidFill>
+                  <a:prstClr val="black"/>
+                </a:solidFill>
+                <a:latin typeface="Calibri" panose="020F0502020204030204"/>
+              </a:rPr>
+              <a:t>Theano</a:t>
+            </a:r>
+            <a:r>
+              <a:rPr lang="zh-CN" altLang="en-US" sz="3600" dirty="0">
+                <a:solidFill>
+                  <a:prstClr val="black"/>
+                </a:solidFill>
+                <a:latin typeface="Calibri" panose="020F0502020204030204"/>
+              </a:rPr>
+              <a:t> </a:t>
+            </a:r>
+            <a:r>
+              <a:rPr lang="en-US" altLang="zh-CN" sz="3600" dirty="0">
+                <a:solidFill>
+                  <a:prstClr val="black"/>
+                </a:solidFill>
+                <a:latin typeface="Calibri" panose="020F0502020204030204"/>
+              </a:rPr>
+              <a:t>(cont.)</a:t>
+            </a:r>
+            <a:endParaRPr lang="en-US" sz="3600" dirty="0">
+              <a:latin typeface="+mn-lt"/>
+            </a:endParaRPr>
+          </a:p>
+        </p:txBody>
+      </p:sp>
+      <p:sp>
+        <p:nvSpPr>
+          <p:cNvPr id="3" name="Content Placeholder 2"/>
+          <p:cNvSpPr>
+            <a:spLocks noGrp="1"/>
+          </p:cNvSpPr>
+          <p:nvPr>
+            <p:ph idx="1"/>
+          </p:nvPr>
+        </p:nvSpPr>
+        <p:spPr>
+          <a:xfrm>
+            <a:off x="628650" y="1136073"/>
+            <a:ext cx="8404514" cy="5611091"/>
+          </a:xfrm>
+        </p:spPr>
+        <p:txBody>
+          <a:bodyPr>
+            <a:normAutofit/>
+          </a:bodyPr>
+          <a:lstStyle/>
+          <a:p>
+            <a:r>
+              <a:rPr lang="en-US" dirty="0"/>
+              <a:t>Symbolic variables in Theano</a:t>
+            </a:r>
+          </a:p>
+          <a:p>
+            <a:endParaRPr lang="en-US" dirty="0"/>
+          </a:p>
+        </p:txBody>
+      </p:sp>
+      <p:sp>
+        <p:nvSpPr>
+          <p:cNvPr id="5" name="Rectangle 4"/>
+          <p:cNvSpPr/>
+          <p:nvPr/>
+        </p:nvSpPr>
+        <p:spPr>
+          <a:xfrm>
+            <a:off x="294794" y="2925680"/>
+            <a:ext cx="3631122" cy="1754326"/>
+          </a:xfrm>
+          <a:prstGeom prst="rect">
+            <a:avLst/>
+          </a:prstGeom>
+        </p:spPr>
+        <p:txBody>
+          <a:bodyPr wrap="none">
+            <a:spAutoFit/>
+          </a:bodyPr>
+          <a:lstStyle/>
+          <a:p>
+            <a:r>
+              <a:rPr lang="en-US" dirty="0">
+                <a:latin typeface="Courier" charset="0"/>
+                <a:ea typeface="Courier" charset="0"/>
+                <a:cs typeface="Courier" charset="0"/>
+              </a:rPr>
+              <a:t>import </a:t>
+            </a:r>
+            <a:r>
+              <a:rPr lang="en-US" dirty="0" smtClean="0">
+                <a:latin typeface="Courier" charset="0"/>
+                <a:ea typeface="Courier" charset="0"/>
+                <a:cs typeface="Courier" charset="0"/>
+              </a:rPr>
+              <a:t>theano</a:t>
+            </a:r>
+          </a:p>
+          <a:p>
+            <a:r>
+              <a:rPr lang="en-US" dirty="0">
+                <a:latin typeface="Courier" charset="0"/>
+                <a:ea typeface="Courier" charset="0"/>
+                <a:cs typeface="Courier" charset="0"/>
+              </a:rPr>
+              <a:t>import </a:t>
+            </a:r>
+            <a:r>
+              <a:rPr lang="en-US" dirty="0" err="1">
+                <a:latin typeface="Courier" charset="0"/>
+                <a:ea typeface="Courier" charset="0"/>
+                <a:cs typeface="Courier" charset="0"/>
+              </a:rPr>
+              <a:t>theano.tensor</a:t>
+            </a:r>
+            <a:r>
+              <a:rPr lang="en-US" dirty="0">
+                <a:latin typeface="Courier" charset="0"/>
+                <a:ea typeface="Courier" charset="0"/>
+                <a:cs typeface="Courier" charset="0"/>
+              </a:rPr>
+              <a:t> as </a:t>
+            </a:r>
+            <a:r>
+              <a:rPr lang="en-US" dirty="0" smtClean="0">
+                <a:latin typeface="Courier" charset="0"/>
+                <a:ea typeface="Courier" charset="0"/>
+                <a:cs typeface="Courier" charset="0"/>
+              </a:rPr>
+              <a:t>T</a:t>
+            </a:r>
+          </a:p>
+          <a:p>
+            <a:r>
+              <a:rPr lang="en-US" dirty="0">
+                <a:latin typeface="Courier" charset="0"/>
+                <a:ea typeface="Courier" charset="0"/>
+                <a:cs typeface="Courier" charset="0"/>
+              </a:rPr>
+              <a:t>x = </a:t>
+            </a:r>
+            <a:r>
+              <a:rPr lang="en-US" dirty="0" err="1" smtClean="0">
+                <a:solidFill>
+                  <a:srgbClr val="0432FF"/>
+                </a:solidFill>
+                <a:latin typeface="Courier" charset="0"/>
+                <a:ea typeface="Courier" charset="0"/>
+                <a:cs typeface="Courier" charset="0"/>
+              </a:rPr>
+              <a:t>T.dvector</a:t>
+            </a:r>
+            <a:r>
+              <a:rPr lang="en-US" dirty="0" smtClean="0">
+                <a:latin typeface="Courier" charset="0"/>
+                <a:ea typeface="Courier" charset="0"/>
+                <a:cs typeface="Courier" charset="0"/>
+              </a:rPr>
+              <a:t>(name='x</a:t>
+            </a:r>
+            <a:r>
+              <a:rPr lang="en-US" dirty="0">
+                <a:latin typeface="Courier" charset="0"/>
+                <a:ea typeface="Courier" charset="0"/>
+                <a:cs typeface="Courier" charset="0"/>
+              </a:rPr>
+              <a:t>')</a:t>
+            </a:r>
+          </a:p>
+          <a:p>
+            <a:r>
+              <a:rPr lang="en-US" dirty="0" err="1">
+                <a:latin typeface="Courier" charset="0"/>
+                <a:ea typeface="Courier" charset="0"/>
+                <a:cs typeface="Courier" charset="0"/>
+              </a:rPr>
+              <a:t>def</a:t>
+            </a:r>
+            <a:r>
+              <a:rPr lang="en-US" dirty="0">
+                <a:latin typeface="Courier" charset="0"/>
+                <a:ea typeface="Courier" charset="0"/>
+                <a:cs typeface="Courier" charset="0"/>
+              </a:rPr>
+              <a:t> f(x):</a:t>
+            </a:r>
+          </a:p>
+          <a:p>
+            <a:r>
+              <a:rPr lang="en-US" dirty="0">
+                <a:latin typeface="Courier" charset="0"/>
+                <a:ea typeface="Courier" charset="0"/>
+                <a:cs typeface="Courier" charset="0"/>
+              </a:rPr>
+              <a:t> </a:t>
+            </a:r>
+            <a:r>
+              <a:rPr lang="en-US" dirty="0" smtClean="0">
+                <a:latin typeface="Courier" charset="0"/>
+                <a:ea typeface="Courier" charset="0"/>
+                <a:cs typeface="Courier" charset="0"/>
+              </a:rPr>
+              <a:t>      return </a:t>
+            </a:r>
+            <a:r>
+              <a:rPr lang="en-US" dirty="0">
+                <a:latin typeface="Courier" charset="0"/>
+                <a:ea typeface="Courier" charset="0"/>
+                <a:cs typeface="Courier" charset="0"/>
+              </a:rPr>
+              <a:t>x ** 2</a:t>
+            </a:r>
+          </a:p>
+          <a:p>
+            <a:r>
+              <a:rPr lang="en-US" dirty="0">
+                <a:latin typeface="Courier" charset="0"/>
+                <a:ea typeface="Courier" charset="0"/>
+                <a:cs typeface="Courier" charset="0"/>
+              </a:rPr>
+              <a:t>y = f(x</a:t>
+            </a:r>
+            <a:r>
+              <a:rPr lang="en-US" dirty="0" smtClean="0">
+                <a:latin typeface="Courier" charset="0"/>
+                <a:ea typeface="Courier" charset="0"/>
+                <a:cs typeface="Courier" charset="0"/>
+              </a:rPr>
+              <a:t>)</a:t>
+            </a:r>
+            <a:endParaRPr lang="en-US" dirty="0">
+              <a:latin typeface="Courier" charset="0"/>
+              <a:ea typeface="Courier" charset="0"/>
+              <a:cs typeface="Courier" charset="0"/>
+            </a:endParaRPr>
+          </a:p>
+        </p:txBody>
+      </p:sp>
+      <p:sp>
+        <p:nvSpPr>
+          <p:cNvPr id="7" name="TextBox 6"/>
+          <p:cNvSpPr txBox="1"/>
+          <p:nvPr/>
+        </p:nvSpPr>
+        <p:spPr>
+          <a:xfrm>
+            <a:off x="4018665" y="1940467"/>
+            <a:ext cx="1624484" cy="400110"/>
+          </a:xfrm>
+          <a:prstGeom prst="rect">
+            <a:avLst/>
+          </a:prstGeom>
+          <a:noFill/>
+        </p:spPr>
+        <p:txBody>
+          <a:bodyPr wrap="none" rtlCol="0">
+            <a:spAutoFit/>
+          </a:bodyPr>
+          <a:lstStyle/>
+          <a:p>
+            <a:r>
+              <a:rPr lang="en-US" sz="2000" dirty="0" smtClean="0">
+                <a:solidFill>
+                  <a:srgbClr val="FF0000"/>
+                </a:solidFill>
+              </a:rPr>
+              <a:t>Variable node</a:t>
+            </a:r>
+            <a:endParaRPr lang="en-US" sz="2000" dirty="0">
+              <a:solidFill>
+                <a:srgbClr val="FF0000"/>
+              </a:solidFill>
+            </a:endParaRPr>
+          </a:p>
+        </p:txBody>
+      </p:sp>
+      <p:sp>
+        <p:nvSpPr>
+          <p:cNvPr id="8" name="TextBox 7"/>
+          <p:cNvSpPr txBox="1"/>
+          <p:nvPr/>
+        </p:nvSpPr>
+        <p:spPr>
+          <a:xfrm>
+            <a:off x="4053049" y="4361945"/>
+            <a:ext cx="1828321" cy="400110"/>
+          </a:xfrm>
+          <a:prstGeom prst="rect">
+            <a:avLst/>
+          </a:prstGeom>
+          <a:noFill/>
+        </p:spPr>
+        <p:txBody>
+          <a:bodyPr wrap="none" rtlCol="0">
+            <a:spAutoFit/>
+          </a:bodyPr>
+          <a:lstStyle/>
+          <a:p>
+            <a:r>
+              <a:rPr lang="en-US" sz="2000" dirty="0" smtClean="0">
+                <a:solidFill>
+                  <a:srgbClr val="FF0000"/>
+                </a:solidFill>
+              </a:rPr>
+              <a:t>Operation node</a:t>
+            </a:r>
+            <a:endParaRPr lang="en-US" sz="2000" dirty="0">
+              <a:solidFill>
+                <a:srgbClr val="FF0000"/>
+              </a:solidFill>
+            </a:endParaRPr>
+          </a:p>
+        </p:txBody>
+      </p:sp>
+      <p:sp>
+        <p:nvSpPr>
+          <p:cNvPr id="9" name="TextBox 8"/>
+          <p:cNvSpPr txBox="1"/>
+          <p:nvPr/>
+        </p:nvSpPr>
+        <p:spPr>
+          <a:xfrm>
+            <a:off x="4053049" y="5865775"/>
+            <a:ext cx="1624484" cy="400110"/>
+          </a:xfrm>
+          <a:prstGeom prst="rect">
+            <a:avLst/>
+          </a:prstGeom>
+          <a:noFill/>
+        </p:spPr>
+        <p:txBody>
+          <a:bodyPr wrap="none" rtlCol="0">
+            <a:spAutoFit/>
+          </a:bodyPr>
+          <a:lstStyle/>
+          <a:p>
+            <a:r>
+              <a:rPr lang="en-US" sz="2000" dirty="0" smtClean="0">
+                <a:solidFill>
+                  <a:srgbClr val="FF0000"/>
+                </a:solidFill>
+              </a:rPr>
+              <a:t>Variable node</a:t>
+            </a:r>
+            <a:endParaRPr lang="en-US" sz="2000" dirty="0">
+              <a:solidFill>
+                <a:srgbClr val="FF0000"/>
+              </a:solidFill>
+            </a:endParaRPr>
+          </a:p>
+        </p:txBody>
+      </p:sp>
+    </p:spTree>
+    <p:extLst>
+      <p:ext uri="{BB962C8B-B14F-4D97-AF65-F5344CB8AC3E}">
+        <p14:creationId xmlns:p14="http://schemas.microsoft.com/office/powerpoint/2010/main" val="1707056552"/>
+      </p:ext>
+    </p:extLst>
+  </p:cSld>
+  <p:clrMapOvr>
+    <a:masterClrMapping/>
+  </p:clrMapOvr>
+  <p:timing>
+    <p:tnLst>
+      <p:par>
+        <p:cTn id="1" dur="indefinite" restart="never" nodeType="tmRoot"/>
+      </p:par>
+    </p:tnLst>
+  </p:timing>
+</p:sld>
+</file>
+
+<file path=ppt/slides/slide8.xml><?xml version="1.0" encoding="utf-8"?>
+<p:sld xmlns:a="http://schemas.openxmlformats.org/drawingml/2006/main" xmlns:r="http://schemas.openxmlformats.org/officeDocument/2006/relationships" xmlns:p="http://schemas.openxmlformats.org/presentationml/2006/main">
+  <p:cSld>
+    <p:spTree>
+      <p:nvGrpSpPr>
+        <p:cNvPr id="1" name=""/>
+        <p:cNvGrpSpPr/>
+        <p:nvPr/>
+      </p:nvGrpSpPr>
+      <p:grpSpPr>
+        <a:xfrm>
+          <a:off x="0" y="0"/>
+          <a:ext cx="0" cy="0"/>
+          <a:chOff x="0" y="0"/>
+          <a:chExt cx="0" cy="0"/>
+        </a:xfrm>
+      </p:grpSpPr>
+      <p:sp>
+        <p:nvSpPr>
+          <p:cNvPr id="2" name="Title 1"/>
+          <p:cNvSpPr>
+            <a:spLocks noGrp="1"/>
+          </p:cNvSpPr>
+          <p:nvPr>
+            <p:ph type="title"/>
+          </p:nvPr>
+        </p:nvSpPr>
+        <p:spPr>
+          <a:xfrm>
+            <a:off x="628650" y="101882"/>
+            <a:ext cx="8404514" cy="909492"/>
+          </a:xfrm>
+        </p:spPr>
+        <p:txBody>
+          <a:bodyPr>
+            <a:normAutofit/>
+          </a:bodyPr>
+          <a:lstStyle/>
+          <a:p>
+            <a:r>
+              <a:rPr lang="en-US" altLang="zh-CN" sz="3600" dirty="0">
+                <a:solidFill>
+                  <a:prstClr val="black"/>
+                </a:solidFill>
+                <a:latin typeface="Calibri" panose="020F0502020204030204"/>
+              </a:rPr>
+              <a:t>Introduction</a:t>
+            </a:r>
+            <a:r>
+              <a:rPr lang="zh-CN" altLang="en-US" sz="3600" dirty="0">
+                <a:solidFill>
+                  <a:prstClr val="black"/>
+                </a:solidFill>
+                <a:latin typeface="Calibri" panose="020F0502020204030204"/>
+              </a:rPr>
+              <a:t> </a:t>
+            </a:r>
+            <a:r>
+              <a:rPr lang="en-US" altLang="zh-CN" sz="3600" dirty="0">
+                <a:solidFill>
+                  <a:prstClr val="black"/>
+                </a:solidFill>
+                <a:latin typeface="Calibri" panose="020F0502020204030204"/>
+              </a:rPr>
+              <a:t>to</a:t>
+            </a:r>
+            <a:r>
+              <a:rPr lang="zh-CN" altLang="en-US" sz="3600" dirty="0">
+                <a:solidFill>
+                  <a:prstClr val="black"/>
+                </a:solidFill>
+                <a:latin typeface="Calibri" panose="020F0502020204030204"/>
+              </a:rPr>
+              <a:t> </a:t>
+            </a:r>
+            <a:r>
+              <a:rPr lang="en-US" altLang="zh-CN" sz="3600" dirty="0">
+                <a:solidFill>
+                  <a:prstClr val="black"/>
+                </a:solidFill>
+                <a:latin typeface="Calibri" panose="020F0502020204030204"/>
+              </a:rPr>
+              <a:t>Theano</a:t>
+            </a:r>
+            <a:r>
+              <a:rPr lang="zh-CN" altLang="en-US" sz="3600" dirty="0">
+                <a:solidFill>
+                  <a:prstClr val="black"/>
+                </a:solidFill>
+                <a:latin typeface="Calibri" panose="020F0502020204030204"/>
+              </a:rPr>
+              <a:t> </a:t>
+            </a:r>
+            <a:r>
+              <a:rPr lang="en-US" altLang="zh-CN" sz="3600" dirty="0">
+                <a:solidFill>
+                  <a:prstClr val="black"/>
+                </a:solidFill>
+                <a:latin typeface="Calibri" panose="020F0502020204030204"/>
+              </a:rPr>
+              <a:t>(cont.)</a:t>
+            </a:r>
+            <a:endParaRPr lang="en-US" sz="3600" dirty="0">
+              <a:latin typeface="+mn-lt"/>
+            </a:endParaRPr>
+          </a:p>
+        </p:txBody>
+      </p:sp>
+      <p:sp>
+        <p:nvSpPr>
+          <p:cNvPr id="3" name="Content Placeholder 2"/>
+          <p:cNvSpPr>
+            <a:spLocks noGrp="1"/>
+          </p:cNvSpPr>
+          <p:nvPr>
+            <p:ph idx="1"/>
+          </p:nvPr>
+        </p:nvSpPr>
+        <p:spPr>
+          <a:xfrm>
+            <a:off x="628650" y="1136073"/>
+            <a:ext cx="8404514" cy="5611091"/>
+          </a:xfrm>
+        </p:spPr>
+        <p:txBody>
+          <a:bodyPr>
+            <a:normAutofit/>
+          </a:bodyPr>
+          <a:lstStyle/>
+          <a:p>
+            <a:r>
+              <a:rPr lang="en-US" dirty="0"/>
+              <a:t>Symbolic variables in Theano</a:t>
+            </a:r>
+          </a:p>
+          <a:p>
+            <a:pPr lvl="1"/>
+            <a:r>
+              <a:rPr lang="en-US" dirty="0" err="1" smtClean="0"/>
+              <a:t>theano.function</a:t>
+            </a:r>
+            <a:r>
+              <a:rPr lang="en-US" dirty="0" smtClean="0"/>
+              <a:t> brings life to theano variables</a:t>
+            </a:r>
+            <a:endParaRPr lang="en-US" dirty="0"/>
+          </a:p>
+        </p:txBody>
+      </p:sp>
+      <p:sp>
+        <p:nvSpPr>
+          <p:cNvPr id="5" name="Rectangle 4"/>
+          <p:cNvSpPr/>
+          <p:nvPr/>
+        </p:nvSpPr>
+        <p:spPr>
+          <a:xfrm>
+            <a:off x="179185" y="2759035"/>
+            <a:ext cx="5836854" cy="3416320"/>
+          </a:xfrm>
+          <a:prstGeom prst="rect">
+            <a:avLst/>
+          </a:prstGeom>
+        </p:spPr>
+        <p:txBody>
+          <a:bodyPr wrap="none">
+            <a:spAutoFit/>
+          </a:bodyPr>
+          <a:lstStyle/>
+          <a:p>
+            <a:r>
+              <a:rPr lang="en-US" dirty="0">
+                <a:latin typeface="Courier" charset="0"/>
+                <a:ea typeface="Courier" charset="0"/>
+                <a:cs typeface="Courier" charset="0"/>
+              </a:rPr>
+              <a:t>import </a:t>
+            </a:r>
+            <a:r>
+              <a:rPr lang="en-US" dirty="0" smtClean="0">
+                <a:latin typeface="Courier" charset="0"/>
+                <a:ea typeface="Courier" charset="0"/>
+                <a:cs typeface="Courier" charset="0"/>
+              </a:rPr>
+              <a:t>theano</a:t>
+            </a:r>
+          </a:p>
+          <a:p>
+            <a:r>
+              <a:rPr lang="en-US" dirty="0">
+                <a:latin typeface="Courier" charset="0"/>
+                <a:ea typeface="Courier" charset="0"/>
+                <a:cs typeface="Courier" charset="0"/>
+              </a:rPr>
+              <a:t>import </a:t>
+            </a:r>
+            <a:r>
+              <a:rPr lang="en-US" dirty="0" err="1">
+                <a:latin typeface="Courier" charset="0"/>
+                <a:ea typeface="Courier" charset="0"/>
+                <a:cs typeface="Courier" charset="0"/>
+              </a:rPr>
+              <a:t>theano.tensor</a:t>
+            </a:r>
+            <a:r>
+              <a:rPr lang="en-US" dirty="0">
+                <a:latin typeface="Courier" charset="0"/>
+                <a:ea typeface="Courier" charset="0"/>
+                <a:cs typeface="Courier" charset="0"/>
+              </a:rPr>
+              <a:t> as </a:t>
+            </a:r>
+            <a:r>
+              <a:rPr lang="en-US" dirty="0" smtClean="0">
+                <a:latin typeface="Courier" charset="0"/>
+                <a:ea typeface="Courier" charset="0"/>
+                <a:cs typeface="Courier" charset="0"/>
+              </a:rPr>
+              <a:t>T</a:t>
+            </a:r>
+          </a:p>
+          <a:p>
+            <a:r>
+              <a:rPr lang="en-US" dirty="0" smtClean="0">
+                <a:latin typeface="Courier" charset="0"/>
+                <a:ea typeface="Courier" charset="0"/>
+                <a:cs typeface="Courier" charset="0"/>
+              </a:rPr>
+              <a:t>import </a:t>
+            </a:r>
+            <a:r>
+              <a:rPr lang="en-US" dirty="0" err="1" smtClean="0">
+                <a:latin typeface="Courier" charset="0"/>
+                <a:ea typeface="Courier" charset="0"/>
+                <a:cs typeface="Courier" charset="0"/>
+              </a:rPr>
+              <a:t>numpy</a:t>
+            </a:r>
+            <a:r>
+              <a:rPr lang="en-US" dirty="0" smtClean="0">
+                <a:latin typeface="Courier" charset="0"/>
+                <a:ea typeface="Courier" charset="0"/>
+                <a:cs typeface="Courier" charset="0"/>
+              </a:rPr>
+              <a:t> as np</a:t>
+            </a:r>
+          </a:p>
+          <a:p>
+            <a:r>
+              <a:rPr lang="en-US" dirty="0">
+                <a:latin typeface="Courier" charset="0"/>
+                <a:ea typeface="Courier" charset="0"/>
+                <a:cs typeface="Courier" charset="0"/>
+              </a:rPr>
+              <a:t>x = </a:t>
+            </a:r>
+            <a:r>
+              <a:rPr lang="en-US" dirty="0" err="1" smtClean="0">
+                <a:solidFill>
+                  <a:srgbClr val="0432FF"/>
+                </a:solidFill>
+                <a:latin typeface="Courier" charset="0"/>
+                <a:ea typeface="Courier" charset="0"/>
+                <a:cs typeface="Courier" charset="0"/>
+              </a:rPr>
+              <a:t>T.dvector</a:t>
+            </a:r>
+            <a:r>
+              <a:rPr lang="en-US" dirty="0" smtClean="0">
+                <a:latin typeface="Courier" charset="0"/>
+                <a:ea typeface="Courier" charset="0"/>
+                <a:cs typeface="Courier" charset="0"/>
+              </a:rPr>
+              <a:t>(name='x</a:t>
+            </a:r>
+            <a:r>
+              <a:rPr lang="en-US" dirty="0">
+                <a:latin typeface="Courier" charset="0"/>
+                <a:ea typeface="Courier" charset="0"/>
+                <a:cs typeface="Courier" charset="0"/>
+              </a:rPr>
+              <a:t>')</a:t>
+            </a:r>
+          </a:p>
+          <a:p>
+            <a:r>
+              <a:rPr lang="en-US" dirty="0" err="1">
+                <a:latin typeface="Courier" charset="0"/>
+                <a:ea typeface="Courier" charset="0"/>
+                <a:cs typeface="Courier" charset="0"/>
+              </a:rPr>
+              <a:t>def</a:t>
+            </a:r>
+            <a:r>
+              <a:rPr lang="en-US" dirty="0">
+                <a:latin typeface="Courier" charset="0"/>
+                <a:ea typeface="Courier" charset="0"/>
+                <a:cs typeface="Courier" charset="0"/>
+              </a:rPr>
+              <a:t> f(x):</a:t>
+            </a:r>
+          </a:p>
+          <a:p>
+            <a:r>
+              <a:rPr lang="en-US" dirty="0">
+                <a:latin typeface="Courier" charset="0"/>
+                <a:ea typeface="Courier" charset="0"/>
+                <a:cs typeface="Courier" charset="0"/>
+              </a:rPr>
+              <a:t> </a:t>
+            </a:r>
+            <a:r>
+              <a:rPr lang="en-US" dirty="0" smtClean="0">
+                <a:latin typeface="Courier" charset="0"/>
+                <a:ea typeface="Courier" charset="0"/>
+                <a:cs typeface="Courier" charset="0"/>
+              </a:rPr>
+              <a:t>   return </a:t>
+            </a:r>
+            <a:r>
+              <a:rPr lang="en-US" dirty="0">
+                <a:latin typeface="Courier" charset="0"/>
+                <a:ea typeface="Courier" charset="0"/>
+                <a:cs typeface="Courier" charset="0"/>
+              </a:rPr>
+              <a:t>x ** 2</a:t>
+            </a:r>
+          </a:p>
+          <a:p>
+            <a:r>
+              <a:rPr lang="en-US" dirty="0">
+                <a:latin typeface="Courier" charset="0"/>
+                <a:ea typeface="Courier" charset="0"/>
+                <a:cs typeface="Courier" charset="0"/>
+              </a:rPr>
+              <a:t>y = f(x</a:t>
+            </a:r>
+            <a:r>
+              <a:rPr lang="en-US" dirty="0" smtClean="0">
+                <a:latin typeface="Courier" charset="0"/>
+                <a:ea typeface="Courier" charset="0"/>
+                <a:cs typeface="Courier" charset="0"/>
+              </a:rPr>
+              <a:t>)</a:t>
+            </a:r>
+          </a:p>
+          <a:p>
+            <a:r>
+              <a:rPr lang="en-US" dirty="0">
+                <a:latin typeface="Courier" charset="0"/>
+                <a:ea typeface="Courier" charset="0"/>
+                <a:cs typeface="Courier" charset="0"/>
+              </a:rPr>
+              <a:t>pow2 = </a:t>
+            </a:r>
+            <a:r>
+              <a:rPr lang="en-US" dirty="0" err="1">
+                <a:solidFill>
+                  <a:srgbClr val="0432FF"/>
+                </a:solidFill>
+                <a:latin typeface="Courier" charset="0"/>
+                <a:ea typeface="Courier" charset="0"/>
+                <a:cs typeface="Courier" charset="0"/>
+              </a:rPr>
+              <a:t>theano.function</a:t>
+            </a:r>
+            <a:r>
+              <a:rPr lang="en-US" dirty="0">
+                <a:latin typeface="Courier" charset="0"/>
+                <a:ea typeface="Courier" charset="0"/>
+                <a:cs typeface="Courier" charset="0"/>
+              </a:rPr>
+              <a:t>(inputs=[x], </a:t>
+            </a:r>
+            <a:endParaRPr lang="en-US" dirty="0" smtClean="0">
+              <a:latin typeface="Courier" charset="0"/>
+              <a:ea typeface="Courier" charset="0"/>
+              <a:cs typeface="Courier" charset="0"/>
+            </a:endParaRPr>
+          </a:p>
+          <a:p>
+            <a:r>
+              <a:rPr lang="en-US" dirty="0">
+                <a:latin typeface="Courier" charset="0"/>
+                <a:ea typeface="Courier" charset="0"/>
+                <a:cs typeface="Courier" charset="0"/>
+              </a:rPr>
+              <a:t> </a:t>
+            </a:r>
+            <a:r>
+              <a:rPr lang="en-US" dirty="0" smtClean="0">
+                <a:latin typeface="Courier" charset="0"/>
+                <a:ea typeface="Courier" charset="0"/>
+                <a:cs typeface="Courier" charset="0"/>
+              </a:rPr>
+              <a:t>                      outputs=y)</a:t>
+            </a:r>
+            <a:endParaRPr lang="en-US" dirty="0">
+              <a:latin typeface="Courier" charset="0"/>
+              <a:ea typeface="Courier" charset="0"/>
+              <a:cs typeface="Courier" charset="0"/>
+            </a:endParaRPr>
+          </a:p>
+          <a:p>
+            <a:r>
+              <a:rPr lang="en-US" dirty="0">
+                <a:latin typeface="Courier" charset="0"/>
+                <a:ea typeface="Courier" charset="0"/>
+                <a:cs typeface="Courier" charset="0"/>
+              </a:rPr>
+              <a:t>a = </a:t>
+            </a:r>
+            <a:r>
+              <a:rPr lang="en-US" dirty="0" err="1">
+                <a:latin typeface="Courier" charset="0"/>
+                <a:ea typeface="Courier" charset="0"/>
+                <a:cs typeface="Courier" charset="0"/>
+              </a:rPr>
+              <a:t>np.array</a:t>
+            </a:r>
+            <a:r>
+              <a:rPr lang="en-US" dirty="0">
+                <a:latin typeface="Courier" charset="0"/>
+                <a:ea typeface="Courier" charset="0"/>
+                <a:cs typeface="Courier" charset="0"/>
+              </a:rPr>
+              <a:t>([1,2,3], </a:t>
+            </a:r>
+            <a:endParaRPr lang="en-US" dirty="0" smtClean="0">
+              <a:latin typeface="Courier" charset="0"/>
+              <a:ea typeface="Courier" charset="0"/>
+              <a:cs typeface="Courier" charset="0"/>
+            </a:endParaRPr>
+          </a:p>
+          <a:p>
+            <a:r>
+              <a:rPr lang="en-US" dirty="0">
+                <a:latin typeface="Courier" charset="0"/>
+                <a:ea typeface="Courier" charset="0"/>
+                <a:cs typeface="Courier" charset="0"/>
+              </a:rPr>
+              <a:t> </a:t>
+            </a:r>
+            <a:r>
+              <a:rPr lang="en-US" dirty="0" smtClean="0">
+                <a:latin typeface="Courier" charset="0"/>
+                <a:ea typeface="Courier" charset="0"/>
+                <a:cs typeface="Courier" charset="0"/>
+              </a:rPr>
+              <a:t>            </a:t>
+            </a:r>
+            <a:r>
+              <a:rPr lang="en-US" dirty="0" err="1" smtClean="0">
+                <a:latin typeface="Courier" charset="0"/>
+                <a:ea typeface="Courier" charset="0"/>
+                <a:cs typeface="Courier" charset="0"/>
+              </a:rPr>
+              <a:t>dtype</a:t>
+            </a:r>
+            <a:r>
+              <a:rPr lang="en-US" dirty="0" smtClean="0">
+                <a:latin typeface="Courier" charset="0"/>
+                <a:ea typeface="Courier" charset="0"/>
+                <a:cs typeface="Courier" charset="0"/>
+              </a:rPr>
+              <a:t>=</a:t>
+            </a:r>
+            <a:r>
+              <a:rPr lang="en-US" dirty="0" err="1" smtClean="0">
+                <a:latin typeface="Courier" charset="0"/>
+                <a:ea typeface="Courier" charset="0"/>
+                <a:cs typeface="Courier" charset="0"/>
+              </a:rPr>
+              <a:t>theano.config.floatX</a:t>
+            </a:r>
+            <a:r>
+              <a:rPr lang="en-US" dirty="0">
+                <a:latin typeface="Courier" charset="0"/>
+                <a:ea typeface="Courier" charset="0"/>
+                <a:cs typeface="Courier" charset="0"/>
+              </a:rPr>
+              <a:t>)</a:t>
+            </a:r>
+          </a:p>
+          <a:p>
+            <a:r>
+              <a:rPr lang="pl-PL" dirty="0">
+                <a:latin typeface="Courier" charset="0"/>
+                <a:ea typeface="Courier" charset="0"/>
+                <a:cs typeface="Courier" charset="0"/>
+              </a:rPr>
+              <a:t>b = pow2(a</a:t>
+            </a:r>
+            <a:r>
+              <a:rPr lang="pl-PL" dirty="0" smtClean="0">
+                <a:latin typeface="Courier" charset="0"/>
+                <a:ea typeface="Courier" charset="0"/>
+                <a:cs typeface="Courier" charset="0"/>
+              </a:rPr>
+              <a:t>)</a:t>
+            </a:r>
+            <a:endParaRPr lang="pl-PL" dirty="0">
+              <a:latin typeface="Courier" charset="0"/>
+              <a:ea typeface="Courier" charset="0"/>
+              <a:cs typeface="Courier" charset="0"/>
+            </a:endParaRPr>
+          </a:p>
+        </p:txBody>
+      </p:sp>
+      <p:grpSp>
+        <p:nvGrpSpPr>
+          <p:cNvPr id="17" name="Group 16"/>
+          <p:cNvGrpSpPr/>
+          <p:nvPr/>
+        </p:nvGrpSpPr>
+        <p:grpSpPr>
+          <a:xfrm>
+            <a:off x="5213603" y="2016846"/>
+            <a:ext cx="3620383" cy="4420119"/>
+            <a:chOff x="5213603" y="2016846"/>
+            <a:chExt cx="3620383" cy="4420119"/>
+          </a:xfrm>
+        </p:grpSpPr>
+        <p:pic>
+          <p:nvPicPr>
+            <p:cNvPr id="4" name="Picture 3"/>
+            <p:cNvPicPr>
+              <a:picLocks noChangeAspect="1"/>
+            </p:cNvPicPr>
+            <p:nvPr/>
+          </p:nvPicPr>
+          <p:blipFill>
+            <a:blip r:embed="rId2">
+              <a:extLst>
+                <a:ext uri="{28A0092B-C50C-407E-A947-70E740481C1C}">
+                  <a14:useLocalDpi xmlns:a14="http://schemas.microsoft.com/office/drawing/2010/main" val="0"/>
+                </a:ext>
+              </a:extLst>
+            </a:blip>
+            <a:stretch>
+              <a:fillRect/>
+            </a:stretch>
+          </p:blipFill>
+          <p:spPr>
+            <a:xfrm>
+              <a:off x="5589020" y="2940361"/>
+              <a:ext cx="3222027" cy="2542312"/>
+            </a:xfrm>
+            <a:prstGeom prst="rect">
+              <a:avLst/>
+            </a:prstGeom>
+          </p:spPr>
+        </p:pic>
+        <p:sp>
+          <p:nvSpPr>
+            <p:cNvPr id="10" name="Down Arrow 9"/>
+            <p:cNvSpPr/>
+            <p:nvPr/>
+          </p:nvSpPr>
+          <p:spPr>
+            <a:xfrm>
+              <a:off x="6622473" y="2448528"/>
+              <a:ext cx="748145" cy="429483"/>
+            </a:xfrm>
+            <a:prstGeom prst="downArrow">
+              <a:avLst/>
+            </a:prstGeom>
+            <a:ln w="28575"/>
+          </p:spPr>
+          <p:style>
+            <a:lnRef idx="2">
+              <a:schemeClr val="accent1"/>
+            </a:lnRef>
+            <a:fillRef idx="1">
+              <a:schemeClr val="lt1"/>
+            </a:fillRef>
+            <a:effectRef idx="0">
+              <a:schemeClr val="accent1"/>
+            </a:effectRef>
+            <a:fontRef idx="minor">
+              <a:schemeClr val="dk1"/>
+            </a:fontRef>
+          </p:style>
+          <p:txBody>
+            <a:bodyPr rtlCol="0" anchor="ctr"/>
+            <a:lstStyle/>
+            <a:p>
+              <a:pPr algn="ctr"/>
+              <a:endParaRPr lang="en-US"/>
+            </a:p>
+          </p:txBody>
+        </p:sp>
+        <p:sp>
+          <p:nvSpPr>
+            <p:cNvPr id="11" name="TextBox 10"/>
+            <p:cNvSpPr txBox="1"/>
+            <p:nvPr/>
+          </p:nvSpPr>
+          <p:spPr>
+            <a:xfrm>
+              <a:off x="6656548" y="2016846"/>
+              <a:ext cx="734496" cy="400110"/>
+            </a:xfrm>
+            <a:prstGeom prst="rect">
+              <a:avLst/>
+            </a:prstGeom>
+            <a:noFill/>
+          </p:spPr>
+          <p:txBody>
+            <a:bodyPr wrap="none" rtlCol="0">
+              <a:spAutoFit/>
+            </a:bodyPr>
+            <a:lstStyle/>
+            <a:p>
+              <a:r>
+                <a:rPr lang="en-US" sz="2000" dirty="0" smtClean="0">
+                  <a:solidFill>
+                    <a:srgbClr val="0432FF"/>
+                  </a:solidFill>
+                </a:rPr>
+                <a:t>input</a:t>
+              </a:r>
+              <a:endParaRPr lang="en-US" dirty="0">
+                <a:solidFill>
+                  <a:srgbClr val="0432FF"/>
+                </a:solidFill>
+              </a:endParaRPr>
+            </a:p>
+          </p:txBody>
+        </p:sp>
+        <p:sp>
+          <p:nvSpPr>
+            <p:cNvPr id="12" name="Down Arrow 11"/>
+            <p:cNvSpPr/>
+            <p:nvPr/>
+          </p:nvSpPr>
+          <p:spPr>
+            <a:xfrm>
+              <a:off x="6622472" y="5607372"/>
+              <a:ext cx="748145" cy="429483"/>
+            </a:xfrm>
+            <a:prstGeom prst="downArrow">
+              <a:avLst/>
+            </a:prstGeom>
+            <a:ln w="28575"/>
+          </p:spPr>
+          <p:style>
+            <a:lnRef idx="2">
+              <a:schemeClr val="accent1"/>
+            </a:lnRef>
+            <a:fillRef idx="1">
+              <a:schemeClr val="lt1"/>
+            </a:fillRef>
+            <a:effectRef idx="0">
+              <a:schemeClr val="accent1"/>
+            </a:effectRef>
+            <a:fontRef idx="minor">
+              <a:schemeClr val="dk1"/>
+            </a:fontRef>
+          </p:style>
+          <p:txBody>
+            <a:bodyPr rtlCol="0" anchor="ctr"/>
+            <a:lstStyle/>
+            <a:p>
+              <a:pPr algn="ctr"/>
+              <a:endParaRPr lang="en-US"/>
+            </a:p>
+          </p:txBody>
+        </p:sp>
+        <p:sp>
+          <p:nvSpPr>
+            <p:cNvPr id="13" name="TextBox 12"/>
+            <p:cNvSpPr txBox="1"/>
+            <p:nvPr/>
+          </p:nvSpPr>
+          <p:spPr>
+            <a:xfrm>
+              <a:off x="6575596" y="6036855"/>
+              <a:ext cx="896399" cy="400110"/>
+            </a:xfrm>
+            <a:prstGeom prst="rect">
+              <a:avLst/>
+            </a:prstGeom>
+            <a:noFill/>
+          </p:spPr>
+          <p:txBody>
+            <a:bodyPr wrap="none" rtlCol="0">
+              <a:spAutoFit/>
+            </a:bodyPr>
+            <a:lstStyle/>
+            <a:p>
+              <a:r>
+                <a:rPr lang="en-US" sz="2000" smtClean="0">
+                  <a:solidFill>
+                    <a:srgbClr val="0432FF"/>
+                  </a:solidFill>
+                </a:rPr>
+                <a:t>output</a:t>
+              </a:r>
+              <a:endParaRPr lang="en-US" dirty="0">
+                <a:solidFill>
+                  <a:srgbClr val="0432FF"/>
+                </a:solidFill>
+              </a:endParaRPr>
+            </a:p>
+          </p:txBody>
+        </p:sp>
+        <p:sp>
+          <p:nvSpPr>
+            <p:cNvPr id="15" name="Rectangle 14"/>
+            <p:cNvSpPr/>
+            <p:nvPr/>
+          </p:nvSpPr>
+          <p:spPr>
+            <a:xfrm>
+              <a:off x="5213603" y="2922772"/>
+              <a:ext cx="3620383" cy="2604662"/>
+            </a:xfrm>
+            <a:prstGeom prst="rect">
+              <a:avLst/>
+            </a:prstGeom>
+            <a:noFill/>
+            <a:ln w="28575"/>
+          </p:spPr>
+          <p:style>
+            <a:lnRef idx="2">
+              <a:schemeClr val="accent1"/>
+            </a:lnRef>
+            <a:fillRef idx="1">
+              <a:schemeClr val="lt1"/>
+            </a:fillRef>
+            <a:effectRef idx="0">
+              <a:schemeClr val="accent1"/>
+            </a:effectRef>
+            <a:fontRef idx="minor">
+              <a:schemeClr val="dk1"/>
+            </a:fontRef>
+          </p:style>
+          <p:txBody>
+            <a:bodyPr rtlCol="0" anchor="ctr"/>
+            <a:lstStyle/>
+            <a:p>
+              <a:pPr algn="ctr"/>
+              <a:endParaRPr lang="en-US"/>
+            </a:p>
+          </p:txBody>
+        </p:sp>
+      </p:grpSp>
+      <p:sp>
+        <p:nvSpPr>
+          <p:cNvPr id="16" name="TextBox 15"/>
+          <p:cNvSpPr txBox="1"/>
+          <p:nvPr/>
+        </p:nvSpPr>
+        <p:spPr>
+          <a:xfrm>
+            <a:off x="1144024" y="6456749"/>
+            <a:ext cx="2711833" cy="369332"/>
+          </a:xfrm>
+          <a:prstGeom prst="rect">
+            <a:avLst/>
+          </a:prstGeom>
+          <a:noFill/>
+        </p:spPr>
+        <p:txBody>
+          <a:bodyPr wrap="none" rtlCol="0">
+            <a:spAutoFit/>
+          </a:bodyPr>
+          <a:lstStyle/>
+          <a:p>
+            <a:r>
+              <a:rPr lang="en-US" dirty="0" smtClean="0"/>
+              <a:t>b is </a:t>
+            </a:r>
+            <a:r>
+              <a:rPr lang="en-US" dirty="0" err="1" smtClean="0"/>
+              <a:t>np.array</a:t>
+            </a:r>
+            <a:r>
+              <a:rPr lang="en-US" dirty="0" smtClean="0"/>
+              <a:t>([1.0, 4.0, 9.0])</a:t>
+            </a:r>
+            <a:endParaRPr lang="en-US" dirty="0"/>
+          </a:p>
+        </p:txBody>
+      </p:sp>
+    </p:spTree>
+    <p:extLst>
+      <p:ext uri="{BB962C8B-B14F-4D97-AF65-F5344CB8AC3E}">
+        <p14:creationId xmlns:p14="http://schemas.microsoft.com/office/powerpoint/2010/main" val="1569654968"/>
+      </p:ext>
+    </p:extLst>
+  </p:cSld>
+  <p:clrMapOvr>
+    <a:masterClrMapping/>
+  </p:clrMapOvr>
+  <p:timing>
+    <p:tnLst>
+      <p:par>
+        <p:cTn id="1" dur="indefinite" restart="never" nodeType="tmRoot"/>
+      </p:par>
+    </p:tnLst>
+  </p:timing>
+</p:sld>
+</file>
+
+<file path=ppt/slides/slide9.xml><?xml version="1.0" encoding="utf-8"?>
+<p:sld xmlns:a="http://schemas.openxmlformats.org/drawingml/2006/main" xmlns:r="http://schemas.openxmlformats.org/officeDocument/2006/relationships" xmlns:p="http://schemas.openxmlformats.org/presentationml/2006/main">
+  <p:cSld>
+    <p:spTree>
+      <p:nvGrpSpPr>
+        <p:cNvPr id="1" name=""/>
+        <p:cNvGrpSpPr/>
+        <p:nvPr/>
+      </p:nvGrpSpPr>
+      <p:grpSpPr>
+        <a:xfrm>
+          <a:off x="0" y="0"/>
+          <a:ext cx="0" cy="0"/>
+          <a:chOff x="0" y="0"/>
+          <a:chExt cx="0" cy="0"/>
+        </a:xfrm>
+      </p:grpSpPr>
+      <p:sp>
+        <p:nvSpPr>
+          <p:cNvPr id="2" name="Title 1"/>
+          <p:cNvSpPr>
+            <a:spLocks noGrp="1"/>
+          </p:cNvSpPr>
+          <p:nvPr>
+            <p:ph type="title"/>
+          </p:nvPr>
+        </p:nvSpPr>
+        <p:spPr>
+          <a:xfrm>
+            <a:off x="628650" y="101882"/>
+            <a:ext cx="8404514" cy="909492"/>
+          </a:xfrm>
+        </p:spPr>
+        <p:txBody>
+          <a:bodyPr>
+            <a:normAutofit/>
+          </a:bodyPr>
+          <a:lstStyle/>
+          <a:p>
+            <a:r>
+              <a:rPr lang="en-US" altLang="zh-CN" sz="3600" dirty="0">
+                <a:solidFill>
+                  <a:prstClr val="black"/>
+                </a:solidFill>
+                <a:latin typeface="Calibri" panose="020F0502020204030204"/>
+              </a:rPr>
+              <a:t>Introduction</a:t>
+            </a:r>
+            <a:r>
+              <a:rPr lang="zh-CN" altLang="en-US" sz="3600" dirty="0">
+                <a:solidFill>
+                  <a:prstClr val="black"/>
+                </a:solidFill>
+                <a:latin typeface="Calibri" panose="020F0502020204030204"/>
+              </a:rPr>
+              <a:t> </a:t>
+            </a:r>
+            <a:r>
+              <a:rPr lang="en-US" altLang="zh-CN" sz="3600" dirty="0">
+                <a:solidFill>
+                  <a:prstClr val="black"/>
+                </a:solidFill>
+                <a:latin typeface="Calibri" panose="020F0502020204030204"/>
+              </a:rPr>
+              <a:t>to</a:t>
+            </a:r>
+            <a:r>
+              <a:rPr lang="zh-CN" altLang="en-US" sz="3600" dirty="0">
+                <a:solidFill>
+                  <a:prstClr val="black"/>
+                </a:solidFill>
+                <a:latin typeface="Calibri" panose="020F0502020204030204"/>
+              </a:rPr>
+              <a:t> </a:t>
+            </a:r>
+            <a:r>
+              <a:rPr lang="en-US" altLang="zh-CN" sz="3600" dirty="0">
+                <a:solidFill>
+                  <a:prstClr val="black"/>
+                </a:solidFill>
+                <a:latin typeface="Calibri" panose="020F0502020204030204"/>
+              </a:rPr>
+              <a:t>Theano</a:t>
+            </a:r>
+            <a:r>
+              <a:rPr lang="zh-CN" altLang="en-US" sz="3600" dirty="0">
+                <a:solidFill>
+                  <a:prstClr val="black"/>
+                </a:solidFill>
+                <a:latin typeface="Calibri" panose="020F0502020204030204"/>
+              </a:rPr>
+              <a:t> </a:t>
+            </a:r>
+            <a:r>
+              <a:rPr lang="en-US" altLang="zh-CN" sz="3600" dirty="0">
+                <a:solidFill>
+                  <a:prstClr val="black"/>
+                </a:solidFill>
+                <a:latin typeface="Calibri" panose="020F0502020204030204"/>
+              </a:rPr>
+              <a:t>(cont.)</a:t>
+            </a:r>
+            <a:endParaRPr lang="en-US" sz="3600" dirty="0">
+              <a:latin typeface="+mn-lt"/>
+            </a:endParaRPr>
+          </a:p>
+        </p:txBody>
+      </p:sp>
+      <p:sp>
+        <p:nvSpPr>
+          <p:cNvPr id="3" name="Content Placeholder 2"/>
+          <p:cNvSpPr>
+            <a:spLocks noGrp="1"/>
+          </p:cNvSpPr>
+          <p:nvPr>
+            <p:ph idx="1"/>
+          </p:nvPr>
+        </p:nvSpPr>
+        <p:spPr>
+          <a:xfrm>
+            <a:off x="628650" y="1136073"/>
+            <a:ext cx="8404514" cy="5611091"/>
+          </a:xfrm>
+        </p:spPr>
+        <p:txBody>
+          <a:bodyPr>
+            <a:normAutofit/>
+          </a:bodyPr>
+          <a:lstStyle/>
+          <a:p>
+            <a:r>
+              <a:rPr lang="en-US" dirty="0"/>
+              <a:t>Symbolic variables in Theano</a:t>
+            </a:r>
+          </a:p>
+          <a:p>
+            <a:pPr lvl="1"/>
+            <a:r>
+              <a:rPr lang="en-US" dirty="0" err="1" smtClean="0"/>
+              <a:t>theano.function</a:t>
+            </a:r>
+            <a:r>
+              <a:rPr lang="en-US" dirty="0" smtClean="0"/>
+              <a:t> brings life to theano variables</a:t>
+            </a:r>
+            <a:endParaRPr lang="en-US" dirty="0"/>
+          </a:p>
+        </p:txBody>
+      </p:sp>
+      <p:sp>
+        <p:nvSpPr>
+          <p:cNvPr id="5" name="Rectangle 4"/>
+          <p:cNvSpPr/>
+          <p:nvPr/>
+        </p:nvSpPr>
+        <p:spPr>
+          <a:xfrm>
+            <a:off x="1675476" y="2094958"/>
+            <a:ext cx="5836854" cy="3693319"/>
+          </a:xfrm>
+          <a:prstGeom prst="rect">
+            <a:avLst/>
+          </a:prstGeom>
+        </p:spPr>
+        <p:txBody>
+          <a:bodyPr wrap="none">
+            <a:spAutoFit/>
+          </a:bodyPr>
+          <a:lstStyle/>
+          <a:p>
+            <a:r>
+              <a:rPr lang="en-US" dirty="0">
+                <a:latin typeface="Courier" charset="0"/>
+                <a:ea typeface="Courier" charset="0"/>
+                <a:cs typeface="Courier" charset="0"/>
+              </a:rPr>
+              <a:t>import </a:t>
+            </a:r>
+            <a:r>
+              <a:rPr lang="en-US" dirty="0" smtClean="0">
+                <a:latin typeface="Courier" charset="0"/>
+                <a:ea typeface="Courier" charset="0"/>
+                <a:cs typeface="Courier" charset="0"/>
+              </a:rPr>
+              <a:t>theano</a:t>
+            </a:r>
+          </a:p>
+          <a:p>
+            <a:r>
+              <a:rPr lang="en-US" dirty="0">
+                <a:latin typeface="Courier" charset="0"/>
+                <a:ea typeface="Courier" charset="0"/>
+                <a:cs typeface="Courier" charset="0"/>
+              </a:rPr>
+              <a:t>import </a:t>
+            </a:r>
+            <a:r>
+              <a:rPr lang="en-US" dirty="0" err="1">
+                <a:latin typeface="Courier" charset="0"/>
+                <a:ea typeface="Courier" charset="0"/>
+                <a:cs typeface="Courier" charset="0"/>
+              </a:rPr>
+              <a:t>theano.tensor</a:t>
+            </a:r>
+            <a:r>
+              <a:rPr lang="en-US" dirty="0">
+                <a:latin typeface="Courier" charset="0"/>
+                <a:ea typeface="Courier" charset="0"/>
+                <a:cs typeface="Courier" charset="0"/>
+              </a:rPr>
+              <a:t> as </a:t>
+            </a:r>
+            <a:r>
+              <a:rPr lang="en-US" dirty="0" smtClean="0">
+                <a:latin typeface="Courier" charset="0"/>
+                <a:ea typeface="Courier" charset="0"/>
+                <a:cs typeface="Courier" charset="0"/>
+              </a:rPr>
+              <a:t>T</a:t>
+            </a:r>
+          </a:p>
+          <a:p>
+            <a:r>
+              <a:rPr lang="en-US" dirty="0" smtClean="0">
+                <a:latin typeface="Courier" charset="0"/>
+                <a:ea typeface="Courier" charset="0"/>
+                <a:cs typeface="Courier" charset="0"/>
+              </a:rPr>
+              <a:t>import </a:t>
+            </a:r>
+            <a:r>
+              <a:rPr lang="en-US" dirty="0" err="1" smtClean="0">
+                <a:latin typeface="Courier" charset="0"/>
+                <a:ea typeface="Courier" charset="0"/>
+                <a:cs typeface="Courier" charset="0"/>
+              </a:rPr>
+              <a:t>numpy</a:t>
+            </a:r>
+            <a:r>
+              <a:rPr lang="en-US" dirty="0" smtClean="0">
+                <a:latin typeface="Courier" charset="0"/>
+                <a:ea typeface="Courier" charset="0"/>
+                <a:cs typeface="Courier" charset="0"/>
+              </a:rPr>
+              <a:t> as np</a:t>
+            </a:r>
+          </a:p>
+          <a:p>
+            <a:r>
+              <a:rPr lang="en-US" dirty="0">
+                <a:latin typeface="Courier" charset="0"/>
+                <a:ea typeface="Courier" charset="0"/>
+                <a:cs typeface="Courier" charset="0"/>
+              </a:rPr>
+              <a:t>x = </a:t>
+            </a:r>
+            <a:r>
+              <a:rPr lang="en-US" dirty="0" err="1">
+                <a:latin typeface="Courier" charset="0"/>
+                <a:ea typeface="Courier" charset="0"/>
+                <a:cs typeface="Courier" charset="0"/>
+              </a:rPr>
+              <a:t>T.dvector</a:t>
+            </a:r>
+            <a:r>
+              <a:rPr lang="en-US" dirty="0">
+                <a:latin typeface="Courier" charset="0"/>
+                <a:ea typeface="Courier" charset="0"/>
+                <a:cs typeface="Courier" charset="0"/>
+              </a:rPr>
+              <a:t>('x')</a:t>
+            </a:r>
+          </a:p>
+          <a:p>
+            <a:r>
+              <a:rPr lang="en-US" dirty="0" err="1">
+                <a:latin typeface="Courier" charset="0"/>
+                <a:ea typeface="Courier" charset="0"/>
+                <a:cs typeface="Courier" charset="0"/>
+              </a:rPr>
+              <a:t>def</a:t>
+            </a:r>
+            <a:r>
+              <a:rPr lang="en-US" dirty="0">
+                <a:latin typeface="Courier" charset="0"/>
+                <a:ea typeface="Courier" charset="0"/>
+                <a:cs typeface="Courier" charset="0"/>
+              </a:rPr>
+              <a:t> f(x):</a:t>
+            </a:r>
+          </a:p>
+          <a:p>
+            <a:r>
+              <a:rPr lang="en-US" dirty="0">
+                <a:latin typeface="Courier" charset="0"/>
+                <a:ea typeface="Courier" charset="0"/>
+                <a:cs typeface="Courier" charset="0"/>
+              </a:rPr>
+              <a:t>return </a:t>
+            </a:r>
+            <a:r>
+              <a:rPr lang="en-US" dirty="0" err="1">
+                <a:latin typeface="Courier" charset="0"/>
+                <a:ea typeface="Courier" charset="0"/>
+                <a:cs typeface="Courier" charset="0"/>
+              </a:rPr>
+              <a:t>x.sum</a:t>
+            </a:r>
+            <a:r>
+              <a:rPr lang="en-US" dirty="0">
+                <a:latin typeface="Courier" charset="0"/>
+                <a:ea typeface="Courier" charset="0"/>
+                <a:cs typeface="Courier" charset="0"/>
+              </a:rPr>
+              <a:t>()</a:t>
+            </a:r>
+          </a:p>
+          <a:p>
+            <a:r>
+              <a:rPr lang="en-US" dirty="0">
+                <a:latin typeface="Courier" charset="0"/>
+                <a:ea typeface="Courier" charset="0"/>
+                <a:cs typeface="Courier" charset="0"/>
+              </a:rPr>
+              <a:t>y = f(x)</a:t>
+            </a:r>
+          </a:p>
+          <a:p>
+            <a:r>
+              <a:rPr lang="en-US" dirty="0">
+                <a:latin typeface="Courier" charset="0"/>
+                <a:ea typeface="Courier" charset="0"/>
+                <a:cs typeface="Courier" charset="0"/>
+              </a:rPr>
+              <a:t>grad = </a:t>
+            </a:r>
+            <a:r>
+              <a:rPr lang="en-US" dirty="0" err="1">
+                <a:latin typeface="Courier" charset="0"/>
+                <a:ea typeface="Courier" charset="0"/>
+                <a:cs typeface="Courier" charset="0"/>
+              </a:rPr>
+              <a:t>T.grad</a:t>
+            </a:r>
+            <a:r>
+              <a:rPr lang="en-US" dirty="0">
+                <a:latin typeface="Courier" charset="0"/>
+                <a:ea typeface="Courier" charset="0"/>
+                <a:cs typeface="Courier" charset="0"/>
+              </a:rPr>
+              <a:t>(cost=y, </a:t>
+            </a:r>
+            <a:r>
+              <a:rPr lang="en-US" dirty="0" err="1">
+                <a:latin typeface="Courier" charset="0"/>
+                <a:ea typeface="Courier" charset="0"/>
+                <a:cs typeface="Courier" charset="0"/>
+              </a:rPr>
+              <a:t>wrt</a:t>
+            </a:r>
+            <a:r>
+              <a:rPr lang="en-US" dirty="0">
+                <a:latin typeface="Courier" charset="0"/>
+                <a:ea typeface="Courier" charset="0"/>
+                <a:cs typeface="Courier" charset="0"/>
+              </a:rPr>
+              <a:t>=[x])</a:t>
+            </a:r>
+          </a:p>
+          <a:p>
+            <a:r>
+              <a:rPr lang="en-US" dirty="0" err="1">
+                <a:latin typeface="Courier" charset="0"/>
+                <a:ea typeface="Courier" charset="0"/>
+                <a:cs typeface="Courier" charset="0"/>
+              </a:rPr>
+              <a:t>grad_func</a:t>
+            </a:r>
+            <a:r>
+              <a:rPr lang="en-US" dirty="0">
+                <a:latin typeface="Courier" charset="0"/>
+                <a:ea typeface="Courier" charset="0"/>
+                <a:cs typeface="Courier" charset="0"/>
+              </a:rPr>
+              <a:t> = </a:t>
+            </a:r>
+            <a:r>
+              <a:rPr lang="en-US" dirty="0" err="1">
+                <a:latin typeface="Courier" charset="0"/>
+                <a:ea typeface="Courier" charset="0"/>
+                <a:cs typeface="Courier" charset="0"/>
+              </a:rPr>
+              <a:t>theano.function</a:t>
+            </a:r>
+            <a:r>
+              <a:rPr lang="en-US" dirty="0">
+                <a:latin typeface="Courier" charset="0"/>
+                <a:ea typeface="Courier" charset="0"/>
+                <a:cs typeface="Courier" charset="0"/>
+              </a:rPr>
+              <a:t>(inputs=[x], </a:t>
+            </a:r>
+            <a:endParaRPr lang="en-US" dirty="0" smtClean="0">
+              <a:latin typeface="Courier" charset="0"/>
+              <a:ea typeface="Courier" charset="0"/>
+              <a:cs typeface="Courier" charset="0"/>
+            </a:endParaRPr>
+          </a:p>
+          <a:p>
+            <a:r>
+              <a:rPr lang="en-US" dirty="0">
+                <a:latin typeface="Courier" charset="0"/>
+                <a:ea typeface="Courier" charset="0"/>
+                <a:cs typeface="Courier" charset="0"/>
+              </a:rPr>
+              <a:t> </a:t>
+            </a:r>
+            <a:r>
+              <a:rPr lang="en-US" dirty="0" smtClean="0">
+                <a:latin typeface="Courier" charset="0"/>
+                <a:ea typeface="Courier" charset="0"/>
+                <a:cs typeface="Courier" charset="0"/>
+              </a:rPr>
+              <a:t>                           outputs=grad</a:t>
+            </a:r>
+            <a:r>
+              <a:rPr lang="en-US" dirty="0">
+                <a:latin typeface="Courier" charset="0"/>
+                <a:ea typeface="Courier" charset="0"/>
+                <a:cs typeface="Courier" charset="0"/>
+              </a:rPr>
+              <a:t>)</a:t>
+            </a:r>
+          </a:p>
+          <a:p>
+            <a:r>
+              <a:rPr lang="en-US" dirty="0">
+                <a:latin typeface="Courier" charset="0"/>
+                <a:ea typeface="Courier" charset="0"/>
+                <a:cs typeface="Courier" charset="0"/>
+              </a:rPr>
+              <a:t>a = </a:t>
+            </a:r>
+            <a:r>
+              <a:rPr lang="en-US" dirty="0" err="1">
+                <a:latin typeface="Courier" charset="0"/>
+                <a:ea typeface="Courier" charset="0"/>
+                <a:cs typeface="Courier" charset="0"/>
+              </a:rPr>
+              <a:t>np.array</a:t>
+            </a:r>
+            <a:r>
+              <a:rPr lang="en-US" dirty="0">
+                <a:latin typeface="Courier" charset="0"/>
+                <a:ea typeface="Courier" charset="0"/>
+                <a:cs typeface="Courier" charset="0"/>
+              </a:rPr>
+              <a:t>([1,2,3], </a:t>
+            </a:r>
+            <a:endParaRPr lang="en-US" dirty="0" smtClean="0">
+              <a:latin typeface="Courier" charset="0"/>
+              <a:ea typeface="Courier" charset="0"/>
+              <a:cs typeface="Courier" charset="0"/>
+            </a:endParaRPr>
+          </a:p>
+          <a:p>
+            <a:r>
+              <a:rPr lang="en-US" dirty="0">
+                <a:latin typeface="Courier" charset="0"/>
+                <a:ea typeface="Courier" charset="0"/>
+                <a:cs typeface="Courier" charset="0"/>
+              </a:rPr>
+              <a:t> </a:t>
+            </a:r>
+            <a:r>
+              <a:rPr lang="en-US" dirty="0" smtClean="0">
+                <a:latin typeface="Courier" charset="0"/>
+                <a:ea typeface="Courier" charset="0"/>
+                <a:cs typeface="Courier" charset="0"/>
+              </a:rPr>
+              <a:t>            </a:t>
+            </a:r>
+            <a:r>
+              <a:rPr lang="en-US" dirty="0" err="1" smtClean="0">
+                <a:latin typeface="Courier" charset="0"/>
+                <a:ea typeface="Courier" charset="0"/>
+                <a:cs typeface="Courier" charset="0"/>
+              </a:rPr>
+              <a:t>dtype</a:t>
+            </a:r>
+            <a:r>
+              <a:rPr lang="en-US" dirty="0" smtClean="0">
+                <a:latin typeface="Courier" charset="0"/>
+                <a:ea typeface="Courier" charset="0"/>
+                <a:cs typeface="Courier" charset="0"/>
+              </a:rPr>
+              <a:t>=</a:t>
+            </a:r>
+            <a:r>
+              <a:rPr lang="en-US" dirty="0" err="1" smtClean="0">
+                <a:latin typeface="Courier" charset="0"/>
+                <a:ea typeface="Courier" charset="0"/>
+                <a:cs typeface="Courier" charset="0"/>
+              </a:rPr>
+              <a:t>theano.config.floatX</a:t>
+            </a:r>
+            <a:r>
+              <a:rPr lang="en-US" dirty="0">
+                <a:latin typeface="Courier" charset="0"/>
+                <a:ea typeface="Courier" charset="0"/>
+                <a:cs typeface="Courier" charset="0"/>
+              </a:rPr>
+              <a:t>)</a:t>
+            </a:r>
+          </a:p>
+          <a:p>
+            <a:r>
+              <a:rPr lang="en-US" dirty="0">
+                <a:latin typeface="Courier" charset="0"/>
+                <a:ea typeface="Courier" charset="0"/>
+                <a:cs typeface="Courier" charset="0"/>
+              </a:rPr>
+              <a:t>print </a:t>
+            </a:r>
+            <a:r>
+              <a:rPr lang="en-US" dirty="0" err="1">
+                <a:latin typeface="Courier" charset="0"/>
+                <a:ea typeface="Courier" charset="0"/>
+                <a:cs typeface="Courier" charset="0"/>
+              </a:rPr>
+              <a:t>grad_func</a:t>
+            </a:r>
+            <a:r>
+              <a:rPr lang="en-US" dirty="0">
+                <a:latin typeface="Courier" charset="0"/>
+                <a:ea typeface="Courier" charset="0"/>
+                <a:cs typeface="Courier" charset="0"/>
+              </a:rPr>
+              <a:t>(a)</a:t>
+            </a:r>
+          </a:p>
+        </p:txBody>
+      </p:sp>
+      <p:sp>
+        <p:nvSpPr>
+          <p:cNvPr id="16" name="TextBox 15"/>
+          <p:cNvSpPr txBox="1"/>
+          <p:nvPr/>
+        </p:nvSpPr>
+        <p:spPr>
+          <a:xfrm>
+            <a:off x="2660443" y="6377830"/>
+            <a:ext cx="3493264" cy="369332"/>
+          </a:xfrm>
+          <a:prstGeom prst="rect">
+            <a:avLst/>
+          </a:prstGeom>
+          <a:noFill/>
+        </p:spPr>
+        <p:txBody>
+          <a:bodyPr wrap="none" rtlCol="0">
+            <a:spAutoFit/>
+          </a:bodyPr>
+          <a:lstStyle/>
+          <a:p>
+            <a:r>
+              <a:rPr lang="tr-TR" dirty="0">
+                <a:latin typeface="Courier" charset="0"/>
+                <a:ea typeface="Courier" charset="0"/>
+                <a:cs typeface="Courier" charset="0"/>
+              </a:rPr>
+              <a:t>[</a:t>
+            </a:r>
+            <a:r>
+              <a:rPr lang="tr-TR" dirty="0" err="1">
+                <a:latin typeface="Courier" charset="0"/>
+                <a:ea typeface="Courier" charset="0"/>
+                <a:cs typeface="Courier" charset="0"/>
+              </a:rPr>
+              <a:t>array</a:t>
+            </a:r>
+            <a:r>
+              <a:rPr lang="tr-TR" dirty="0">
+                <a:latin typeface="Courier" charset="0"/>
+                <a:ea typeface="Courier" charset="0"/>
+                <a:cs typeface="Courier" charset="0"/>
+              </a:rPr>
+              <a:t>([ 1.,  1.,  1.])]</a:t>
+            </a:r>
+            <a:endParaRPr lang="en-US" dirty="0">
+              <a:latin typeface="Courier" charset="0"/>
+              <a:ea typeface="Courier" charset="0"/>
+              <a:cs typeface="Courier" charset="0"/>
+            </a:endParaRPr>
+          </a:p>
+        </p:txBody>
+      </p:sp>
+    </p:spTree>
+    <p:extLst>
+      <p:ext uri="{BB962C8B-B14F-4D97-AF65-F5344CB8AC3E}">
+        <p14:creationId xmlns:p14="http://schemas.microsoft.com/office/powerpoint/2010/main" val="620529490"/>
       </p:ext>
     </p:extLst>
   </p:cSld>
@@ -3688,4 +7417,265 @@
     </a:ext>
   </a:extLst>
 </a:theme>
+</file>
+
+<file path=ppt/theme/theme2.xml><?xml version="1.0" encoding="utf-8"?>
+<a:theme xmlns:a="http://schemas.openxmlformats.org/drawingml/2006/main" name="Office Theme">
+  <a:themeElements>
+    <a:clrScheme name="Office">
+      <a:dk1>
+        <a:sysClr val="windowText" lastClr="000000"/>
+      </a:dk1>
+      <a:lt1>
+        <a:sysClr val="window" lastClr="FFFFFF"/>
+      </a:lt1>
+      <a:dk2>
+        <a:srgbClr val="44546A"/>
+      </a:dk2>
+      <a:lt2>
+        <a:srgbClr val="E7E6E6"/>
+      </a:lt2>
+      <a:accent1>
+        <a:srgbClr val="5B9BD5"/>
+      </a:accent1>
+      <a:accent2>
+        <a:srgbClr val="ED7D31"/>
+      </a:accent2>
+      <a:accent3>
+        <a:srgbClr val="A5A5A5"/>
+      </a:accent3>
+      <a:accent4>
+        <a:srgbClr val="FFC000"/>
+      </a:accent4>
+      <a:accent5>
+        <a:srgbClr val="4472C4"/>
+      </a:accent5>
+      <a:accent6>
+        <a:srgbClr val="70AD47"/>
+      </a:accent6>
+      <a:hlink>
+        <a:srgbClr val="0563C1"/>
+      </a:hlink>
+      <a:folHlink>
+        <a:srgbClr val="954F72"/>
+      </a:folHlink>
+    </a:clrScheme>
+    <a:fontScheme name="Office">
+      <a:majorFont>
+        <a:latin typeface="Calibri Light" panose="020F0302020204030204"/>
+        <a:ea typeface=""/>
+        <a:cs typeface=""/>
+        <a:font script="Jpan" typeface="ＭＳ Ｐゴシック"/>
+        <a:font script="Hang" typeface="맑은 고딕"/>
+        <a:font script="Hans" typeface="宋体"/>
+        <a:font script="Hant" typeface="新細明體"/>
+        <a:font script="Arab" typeface="Times New Roman"/>
+        <a:font script="Hebr" typeface="Times New Roman"/>
+        <a:font script="Thai" typeface="Angsana New"/>
+        <a:font script="Ethi" typeface="Nyala"/>
+        <a:font script="Beng" typeface="Vrinda"/>
+        <a:font script="Gujr" typeface="Shruti"/>
+        <a:font script="Khmr" typeface="MoolBoran"/>
+        <a:font script="Knda" typeface="Tunga"/>
+        <a:font script="Guru" typeface="Raavi"/>
+        <a:font script="Cans" typeface="Euphemia"/>
+        <a:font script="Cher" typeface="Plantagenet Cherokee"/>
+        <a:font script="Yiii" typeface="Microsoft Yi Baiti"/>
+        <a:font script="Tibt" typeface="Microsoft Himalaya"/>
+        <a:font script="Thaa" typeface="MV Boli"/>
+        <a:font script="Deva" typeface="Mangal"/>
+        <a:font script="Telu" typeface="Gautami"/>
+        <a:font script="Taml" typeface="Latha"/>
+        <a:font script="Syrc" typeface="Estrangelo Edessa"/>
+        <a:font script="Orya" typeface="Kalinga"/>
+        <a:font script="Mlym" typeface="Kartika"/>
+        <a:font script="Laoo" typeface="DokChampa"/>
+        <a:font script="Sinh" typeface="Iskoola Pota"/>
+        <a:font script="Mong" typeface="Mongolian Baiti"/>
+        <a:font script="Viet" typeface="Times New Roman"/>
+        <a:font script="Uigh" typeface="Microsoft Uighur"/>
+        <a:font script="Geor" typeface="Sylfaen"/>
+      </a:majorFont>
+      <a:minorFont>
+        <a:latin typeface="Calibri" panose="020F0502020204030204"/>
+        <a:ea typeface=""/>
+        <a:cs typeface=""/>
+        <a:font script="Jpan" typeface="ＭＳ Ｐゴシック"/>
+        <a:font script="Hang" typeface="맑은 고딕"/>
+        <a:font script="Hans" typeface="宋体"/>
+        <a:font script="Hant" typeface="新細明體"/>
+        <a:font script="Arab" typeface="Arial"/>
+        <a:font script="Hebr" typeface="Arial"/>
+        <a:font script="Thai" typeface="Cordia New"/>
+        <a:font script="Ethi" typeface="Nyala"/>
+        <a:font script="Beng" typeface="Vrinda"/>
+        <a:font script="Gujr" typeface="Shruti"/>
+        <a:font script="Khmr" typeface="DaunPenh"/>
+        <a:font script="Knda" typeface="Tunga"/>
+        <a:font script="Guru" typeface="Raavi"/>
+        <a:font script="Cans" typeface="Euphemia"/>
+        <a:font script="Cher" typeface="Plantagenet Cherokee"/>
+        <a:font script="Yiii" typeface="Microsoft Yi Baiti"/>
+        <a:font script="Tibt" typeface="Microsoft Himalaya"/>
+        <a:font script="Thaa" typeface="MV Boli"/>
+        <a:font script="Deva" typeface="Mangal"/>
+        <a:font script="Telu" typeface="Gautami"/>
+        <a:font script="Taml" typeface="Latha"/>
+        <a:font script="Syrc" typeface="Estrangelo Edessa"/>
+        <a:font script="Orya" typeface="Kalinga"/>
+        <a:font script="Mlym" typeface="Kartika"/>
+        <a:font script="Laoo" typeface="DokChampa"/>
+        <a:font script="Sinh" typeface="Iskoola Pota"/>
+        <a:font script="Mong" typeface="Mongolian Baiti"/>
+        <a:font script="Viet" typeface="Arial"/>
+        <a:font script="Uigh" typeface="Microsoft Uighur"/>
+        <a:font script="Geor" typeface="Sylfaen"/>
+      </a:minorFont>
+    </a:fontScheme>
+    <a:fmtScheme name="Office">
+      <a:fillStyleLst>
+        <a:solidFill>
+          <a:schemeClr val="phClr"/>
+        </a:solidFill>
+        <a:gradFill rotWithShape="1">
+          <a:gsLst>
+            <a:gs pos="0">
+              <a:schemeClr val="phClr">
+                <a:lumMod val="110000"/>
+                <a:satMod val="105000"/>
+                <a:tint val="67000"/>
+              </a:schemeClr>
+            </a:gs>
+            <a:gs pos="50000">
+              <a:schemeClr val="phClr">
+                <a:lumMod val="105000"/>
+                <a:satMod val="103000"/>
+                <a:tint val="73000"/>
+              </a:schemeClr>
+            </a:gs>
+            <a:gs pos="100000">
+              <a:schemeClr val="phClr">
+                <a:lumMod val="105000"/>
+                <a:satMod val="109000"/>
+                <a:tint val="81000"/>
+              </a:schemeClr>
+            </a:gs>
+          </a:gsLst>
+          <a:lin ang="5400000" scaled="0"/>
+        </a:gradFill>
+        <a:gradFill rotWithShape="1">
+          <a:gsLst>
+            <a:gs pos="0">
+              <a:schemeClr val="phClr">
+                <a:satMod val="103000"/>
+                <a:lumMod val="102000"/>
+                <a:tint val="94000"/>
+              </a:schemeClr>
+            </a:gs>
+            <a:gs pos="50000">
+              <a:schemeClr val="phClr">
+                <a:satMod val="110000"/>
+                <a:lumMod val="100000"/>
+                <a:shade val="100000"/>
+              </a:schemeClr>
+            </a:gs>
+            <a:gs pos="100000">
+              <a:schemeClr val="phClr">
+                <a:lumMod val="99000"/>
+                <a:satMod val="120000"/>
+                <a:shade val="78000"/>
+              </a:schemeClr>
+            </a:gs>
+          </a:gsLst>
+          <a:lin ang="5400000" scaled="0"/>
+        </a:gradFill>
+      </a:fillStyleLst>
+      <a:lnStyleLst>
+        <a:ln w="6350" cap="flat" cmpd="sng" algn="ctr">
+          <a:solidFill>
+            <a:schemeClr val="phClr"/>
+          </a:solidFill>
+          <a:prstDash val="solid"/>
+          <a:miter lim="800000"/>
+        </a:ln>
+        <a:ln w="12700" cap="flat" cmpd="sng" algn="ctr">
+          <a:solidFill>
+            <a:schemeClr val="phClr"/>
+          </a:solidFill>
+          <a:prstDash val="solid"/>
+          <a:miter lim="800000"/>
+        </a:ln>
+        <a:ln w="19050" cap="flat" cmpd="sng" algn="ctr">
+          <a:solidFill>
+            <a:schemeClr val="phClr"/>
+          </a:solidFill>
+          <a:prstDash val="solid"/>
+          <a:miter lim="800000"/>
+        </a:ln>
+      </a:lnStyleLst>
+      <a:effectStyleLst>
+        <a:effectStyle>
+          <a:effectLst/>
+        </a:effectStyle>
+        <a:effectStyle>
+          <a:effectLst/>
+        </a:effectStyle>
+        <a:effectStyle>
+          <a:effectLst>
+            <a:outerShdw blurRad="57150" dist="19050" dir="5400000" algn="ctr" rotWithShape="0">
+              <a:srgbClr val="000000">
+                <a:alpha val="63000"/>
+              </a:srgbClr>
+            </a:outerShdw>
+          </a:effectLst>
+        </a:effectStyle>
+      </a:effectStyleLst>
+      <a:bgFillStyleLst>
+        <a:solidFill>
+          <a:schemeClr val="phClr"/>
+        </a:solidFill>
+        <a:solidFill>
+          <a:schemeClr val="phClr">
+            <a:tint val="95000"/>
+            <a:satMod val="170000"/>
+          </a:schemeClr>
+        </a:solidFill>
+        <a:gradFill rotWithShape="1">
+          <a:gsLst>
+            <a:gs pos="0">
+              <a:schemeClr val="phClr">
+                <a:tint val="93000"/>
+                <a:satMod val="150000"/>
+                <a:shade val="98000"/>
+                <a:lumMod val="102000"/>
+              </a:schemeClr>
+            </a:gs>
+            <a:gs pos="50000">
+              <a:schemeClr val="phClr">
+                <a:tint val="98000"/>
+                <a:satMod val="130000"/>
+                <a:shade val="90000"/>
+                <a:lumMod val="103000"/>
+              </a:schemeClr>
+            </a:gs>
+            <a:gs pos="100000">
+              <a:schemeClr val="phClr">
+                <a:shade val="63000"/>
+                <a:satMod val="120000"/>
+              </a:schemeClr>
+            </a:gs>
+          </a:gsLst>
+          <a:lin ang="5400000" scaled="0"/>
+        </a:gradFill>
+      </a:bgFillStyleLst>
+    </a:fmtScheme>
+  </a:themeElements>
+  <a:objectDefaults/>
+  <a:extraClrSchemeLst/>
+  <a:extLst>
+    <a:ext uri="{05A4C25C-085E-4340-85A3-A5531E510DB2}">
+      <thm15:themeFamily xmlns:thm15="http://schemas.microsoft.com/office/thememl/2012/main" name="Office Theme" id="{62F939B6-93AF-4DB8-9C6B-D6C7DFDC589F}" vid="{4A3C46E8-61CC-4603-A589-7422A47A8E4A}"/>
+    </a:ext>
+  </a:extLst>
+</a:theme>
 </file>
</xml_diff>